<commit_message>
create simple age schedule plot; produce presentation
</commit_message>
<xml_diff>
--- a/presentation/comparative_fertility_presentation.pptx
+++ b/presentation/comparative_fertility_presentation.pptx
@@ -9,6 +9,29 @@
     <p:sldId id="257" r:id="rId3"/>
     <p:sldId id="258" r:id="rId4"/>
     <p:sldId id="259" r:id="rId5"/>
+    <p:sldId id="262" r:id="rId6"/>
+    <p:sldId id="260" r:id="rId7"/>
+    <p:sldId id="263" r:id="rId8"/>
+    <p:sldId id="261" r:id="rId9"/>
+    <p:sldId id="264" r:id="rId10"/>
+    <p:sldId id="265" r:id="rId11"/>
+    <p:sldId id="266" r:id="rId12"/>
+    <p:sldId id="267" r:id="rId13"/>
+    <p:sldId id="268" r:id="rId14"/>
+    <p:sldId id="269" r:id="rId15"/>
+    <p:sldId id="270" r:id="rId16"/>
+    <p:sldId id="272" r:id="rId17"/>
+    <p:sldId id="273" r:id="rId18"/>
+    <p:sldId id="274" r:id="rId19"/>
+    <p:sldId id="275" r:id="rId20"/>
+    <p:sldId id="271" r:id="rId21"/>
+    <p:sldId id="276" r:id="rId22"/>
+    <p:sldId id="277" r:id="rId23"/>
+    <p:sldId id="278" r:id="rId24"/>
+    <p:sldId id="279" r:id="rId25"/>
+    <p:sldId id="280" r:id="rId26"/>
+    <p:sldId id="281" r:id="rId27"/>
+    <p:sldId id="282" r:id="rId28"/>
   </p:sldIdLst>
   <p:sldSz cx="12192000" cy="6858000"/>
   <p:notesSz cx="6858000" cy="9144000"/>
@@ -107,6 +130,11 @@
       </a:defRPr>
     </a:lvl9pPr>
   </p:defaultTextStyle>
+  <p:extLst>
+    <p:ext uri="{EFAFB233-063F-42B5-8137-9DF3F51BA10A}">
+      <p15:sldGuideLst xmlns:p15="http://schemas.microsoft.com/office/powerpoint/2012/main"/>
+    </p:ext>
+  </p:extLst>
 </p:presentation>
 </file>
 
@@ -241,7 +269,7 @@
           <a:p>
             <a:fld id="{6622FFC5-3883-47EE-9FC1-93C370300F72}" type="datetimeFigureOut">
               <a:rPr lang="en-GB" smtClean="0"/>
-              <a:t>28/06/2016</a:t>
+              <a:t>29/06/2016</a:t>
             </a:fld>
             <a:endParaRPr lang="en-GB"/>
           </a:p>
@@ -411,7 +439,7 @@
           <a:p>
             <a:fld id="{6622FFC5-3883-47EE-9FC1-93C370300F72}" type="datetimeFigureOut">
               <a:rPr lang="en-GB" smtClean="0"/>
-              <a:t>28/06/2016</a:t>
+              <a:t>29/06/2016</a:t>
             </a:fld>
             <a:endParaRPr lang="en-GB"/>
           </a:p>
@@ -591,7 +619,7 @@
           <a:p>
             <a:fld id="{6622FFC5-3883-47EE-9FC1-93C370300F72}" type="datetimeFigureOut">
               <a:rPr lang="en-GB" smtClean="0"/>
-              <a:t>28/06/2016</a:t>
+              <a:t>29/06/2016</a:t>
             </a:fld>
             <a:endParaRPr lang="en-GB"/>
           </a:p>
@@ -761,7 +789,7 @@
           <a:p>
             <a:fld id="{6622FFC5-3883-47EE-9FC1-93C370300F72}" type="datetimeFigureOut">
               <a:rPr lang="en-GB" smtClean="0"/>
-              <a:t>28/06/2016</a:t>
+              <a:t>29/06/2016</a:t>
             </a:fld>
             <a:endParaRPr lang="en-GB"/>
           </a:p>
@@ -1007,7 +1035,7 @@
           <a:p>
             <a:fld id="{6622FFC5-3883-47EE-9FC1-93C370300F72}" type="datetimeFigureOut">
               <a:rPr lang="en-GB" smtClean="0"/>
-              <a:t>28/06/2016</a:t>
+              <a:t>29/06/2016</a:t>
             </a:fld>
             <a:endParaRPr lang="en-GB"/>
           </a:p>
@@ -1239,7 +1267,7 @@
           <a:p>
             <a:fld id="{6622FFC5-3883-47EE-9FC1-93C370300F72}" type="datetimeFigureOut">
               <a:rPr lang="en-GB" smtClean="0"/>
-              <a:t>28/06/2016</a:t>
+              <a:t>29/06/2016</a:t>
             </a:fld>
             <a:endParaRPr lang="en-GB"/>
           </a:p>
@@ -1606,7 +1634,7 @@
           <a:p>
             <a:fld id="{6622FFC5-3883-47EE-9FC1-93C370300F72}" type="datetimeFigureOut">
               <a:rPr lang="en-GB" smtClean="0"/>
-              <a:t>28/06/2016</a:t>
+              <a:t>29/06/2016</a:t>
             </a:fld>
             <a:endParaRPr lang="en-GB"/>
           </a:p>
@@ -1724,7 +1752,7 @@
           <a:p>
             <a:fld id="{6622FFC5-3883-47EE-9FC1-93C370300F72}" type="datetimeFigureOut">
               <a:rPr lang="en-GB" smtClean="0"/>
-              <a:t>28/06/2016</a:t>
+              <a:t>29/06/2016</a:t>
             </a:fld>
             <a:endParaRPr lang="en-GB"/>
           </a:p>
@@ -1819,7 +1847,7 @@
           <a:p>
             <a:fld id="{6622FFC5-3883-47EE-9FC1-93C370300F72}" type="datetimeFigureOut">
               <a:rPr lang="en-GB" smtClean="0"/>
-              <a:t>28/06/2016</a:t>
+              <a:t>29/06/2016</a:t>
             </a:fld>
             <a:endParaRPr lang="en-GB"/>
           </a:p>
@@ -2096,7 +2124,7 @@
           <a:p>
             <a:fld id="{6622FFC5-3883-47EE-9FC1-93C370300F72}" type="datetimeFigureOut">
               <a:rPr lang="en-GB" smtClean="0"/>
-              <a:t>28/06/2016</a:t>
+              <a:t>29/06/2016</a:t>
             </a:fld>
             <a:endParaRPr lang="en-GB"/>
           </a:p>
@@ -2349,7 +2377,7 @@
           <a:p>
             <a:fld id="{6622FFC5-3883-47EE-9FC1-93C370300F72}" type="datetimeFigureOut">
               <a:rPr lang="en-GB" smtClean="0"/>
-              <a:t>28/06/2016</a:t>
+              <a:t>29/06/2016</a:t>
             </a:fld>
             <a:endParaRPr lang="en-GB"/>
           </a:p>
@@ -2562,7 +2590,7 @@
           <a:p>
             <a:fld id="{6622FFC5-3883-47EE-9FC1-93C370300F72}" type="datetimeFigureOut">
               <a:rPr lang="en-GB" smtClean="0"/>
-              <a:t>28/06/2016</a:t>
+              <a:t>29/06/2016</a:t>
             </a:fld>
             <a:endParaRPr lang="en-GB"/>
           </a:p>
@@ -2986,7 +3014,19 @@
           <a:p>
             <a:r>
               <a:rPr lang="en-GB" dirty="0" smtClean="0"/>
-              <a:t>Fertility (and futures?) of 46 countries: Lexis surface data visualisations</a:t>
+              <a:t>Fertility (and futures?) </a:t>
+            </a:r>
+            <a:r>
+              <a:rPr lang="en-GB" smtClean="0"/>
+              <a:t>of </a:t>
+            </a:r>
+            <a:r>
+              <a:rPr lang="en-GB" smtClean="0"/>
+              <a:t>45 </a:t>
+            </a:r>
+            <a:r>
+              <a:rPr lang="en-GB" dirty="0" smtClean="0"/>
+              <a:t>countries: Lexis surface data visualisations</a:t>
             </a:r>
             <a:endParaRPr lang="en-GB" dirty="0"/>
           </a:p>
@@ -3043,6 +3083,1498 @@
   <p:clrMapOvr>
     <a:masterClrMapping/>
   </p:clrMapOvr>
+  <p:timing>
+    <p:tnLst>
+      <p:par>
+        <p:cTn id="1" dur="indefinite" restart="never" nodeType="tmRoot"/>
+      </p:par>
+    </p:tnLst>
+  </p:timing>
+</p:sld>
+</file>
+
+<file path=ppt/slides/slide10.xml><?xml version="1.0" encoding="utf-8"?>
+<p:sld xmlns:a="http://schemas.openxmlformats.org/drawingml/2006/main" xmlns:r="http://schemas.openxmlformats.org/officeDocument/2006/relationships" xmlns:p="http://schemas.openxmlformats.org/presentationml/2006/main">
+  <p:cSld>
+    <p:spTree>
+      <p:nvGrpSpPr>
+        <p:cNvPr id="1" name=""/>
+        <p:cNvGrpSpPr/>
+        <p:nvPr/>
+      </p:nvGrpSpPr>
+      <p:grpSpPr>
+        <a:xfrm>
+          <a:off x="0" y="0"/>
+          <a:ext cx="0" cy="0"/>
+          <a:chOff x="0" y="0"/>
+          <a:chExt cx="0" cy="0"/>
+        </a:xfrm>
+      </p:grpSpPr>
+      <p:sp>
+        <p:nvSpPr>
+          <p:cNvPr id="2" name="Title 1"/>
+          <p:cNvSpPr>
+            <a:spLocks noGrp="1"/>
+          </p:cNvSpPr>
+          <p:nvPr>
+            <p:ph type="title"/>
+          </p:nvPr>
+        </p:nvSpPr>
+        <p:spPr/>
+        <p:txBody>
+          <a:bodyPr/>
+          <a:lstStyle/>
+          <a:p>
+            <a:r>
+              <a:rPr lang="en-GB" dirty="0"/>
+              <a:t>Period measures and cohort measures</a:t>
+            </a:r>
+          </a:p>
+        </p:txBody>
+      </p:sp>
+      <p:sp>
+        <p:nvSpPr>
+          <p:cNvPr id="3" name="Content Placeholder 2"/>
+          <p:cNvSpPr>
+            <a:spLocks noGrp="1"/>
+          </p:cNvSpPr>
+          <p:nvPr>
+            <p:ph idx="1"/>
+          </p:nvPr>
+        </p:nvSpPr>
+        <p:spPr/>
+        <p:txBody>
+          <a:bodyPr/>
+          <a:lstStyle/>
+          <a:p>
+            <a:r>
+              <a:rPr lang="en-GB" dirty="0"/>
+              <a:t>Real cohorts are birth cohorts</a:t>
+            </a:r>
+          </a:p>
+          <a:p>
+            <a:pPr lvl="1"/>
+            <a:r>
+              <a:rPr lang="en-GB" dirty="0"/>
+              <a:t>Total fertility of 1920s cohorts: known</a:t>
+            </a:r>
+          </a:p>
+          <a:p>
+            <a:pPr lvl="1"/>
+            <a:r>
+              <a:rPr lang="en-GB" dirty="0"/>
+              <a:t>Total fertility of 1980s cohorts: unknown</a:t>
+            </a:r>
+          </a:p>
+          <a:p>
+            <a:endParaRPr lang="en-GB" dirty="0" smtClean="0"/>
+          </a:p>
+          <a:p>
+            <a:r>
+              <a:rPr lang="en-GB" dirty="0" smtClean="0"/>
+              <a:t>Important unknowns</a:t>
+            </a:r>
+          </a:p>
+          <a:p>
+            <a:pPr lvl="1"/>
+            <a:r>
+              <a:rPr lang="en-GB" dirty="0" smtClean="0"/>
+              <a:t>Time to first birth</a:t>
+            </a:r>
+          </a:p>
+          <a:p>
+            <a:pPr lvl="1"/>
+            <a:r>
+              <a:rPr lang="en-GB" dirty="0" smtClean="0"/>
+              <a:t>Interval between births (Tempo changes)</a:t>
+            </a:r>
+            <a:endParaRPr lang="en-GB" dirty="0"/>
+          </a:p>
+        </p:txBody>
+      </p:sp>
+    </p:spTree>
+    <p:extLst>
+      <p:ext uri="{BB962C8B-B14F-4D97-AF65-F5344CB8AC3E}">
+        <p14:creationId xmlns:p14="http://schemas.microsoft.com/office/powerpoint/2010/main" val="897732752"/>
+      </p:ext>
+    </p:extLst>
+  </p:cSld>
+  <p:clrMapOvr>
+    <a:masterClrMapping/>
+  </p:clrMapOvr>
+  <p:timing>
+    <p:tnLst>
+      <p:par>
+        <p:cTn id="1" dur="indefinite" restart="never" nodeType="tmRoot"/>
+      </p:par>
+    </p:tnLst>
+  </p:timing>
+</p:sld>
+</file>
+
+<file path=ppt/slides/slide11.xml><?xml version="1.0" encoding="utf-8"?>
+<p:sld xmlns:a="http://schemas.openxmlformats.org/drawingml/2006/main" xmlns:r="http://schemas.openxmlformats.org/officeDocument/2006/relationships" xmlns:p="http://schemas.openxmlformats.org/presentationml/2006/main">
+  <p:cSld>
+    <p:spTree>
+      <p:nvGrpSpPr>
+        <p:cNvPr id="1" name=""/>
+        <p:cNvGrpSpPr/>
+        <p:nvPr/>
+      </p:nvGrpSpPr>
+      <p:grpSpPr>
+        <a:xfrm>
+          <a:off x="0" y="0"/>
+          <a:ext cx="0" cy="0"/>
+          <a:chOff x="0" y="0"/>
+          <a:chExt cx="0" cy="0"/>
+        </a:xfrm>
+      </p:grpSpPr>
+      <p:sp>
+        <p:nvSpPr>
+          <p:cNvPr id="2" name="Title 1"/>
+          <p:cNvSpPr>
+            <a:spLocks noGrp="1"/>
+          </p:cNvSpPr>
+          <p:nvPr>
+            <p:ph type="title"/>
+          </p:nvPr>
+        </p:nvSpPr>
+        <p:spPr/>
+        <p:txBody>
+          <a:bodyPr/>
+          <a:lstStyle/>
+          <a:p>
+            <a:r>
+              <a:rPr lang="en-GB" dirty="0" smtClean="0"/>
+              <a:t>Methods: data</a:t>
+            </a:r>
+            <a:endParaRPr lang="en-GB" dirty="0"/>
+          </a:p>
+        </p:txBody>
+      </p:sp>
+      <p:sp>
+        <p:nvSpPr>
+          <p:cNvPr id="3" name="Content Placeholder 2"/>
+          <p:cNvSpPr>
+            <a:spLocks noGrp="1"/>
+          </p:cNvSpPr>
+          <p:nvPr>
+            <p:ph idx="1"/>
+          </p:nvPr>
+        </p:nvSpPr>
+        <p:spPr/>
+        <p:txBody>
+          <a:bodyPr>
+            <a:normAutofit/>
+          </a:bodyPr>
+          <a:lstStyle/>
+          <a:p>
+            <a:r>
+              <a:rPr lang="en-GB" dirty="0"/>
+              <a:t>Human Fertility Database: </a:t>
+            </a:r>
+            <a:r>
+              <a:rPr lang="en-GB" dirty="0">
+                <a:hlinkClick r:id="rId2"/>
+              </a:rPr>
+              <a:t>http://www.humanfertility.org</a:t>
+            </a:r>
+            <a:r>
+              <a:rPr lang="en-GB" dirty="0" smtClean="0">
+                <a:hlinkClick r:id="rId2"/>
+              </a:rPr>
+              <a:t>/</a:t>
+            </a:r>
+            <a:r>
+              <a:rPr lang="en-GB" dirty="0" smtClean="0"/>
+              <a:t> </a:t>
+            </a:r>
+            <a:endParaRPr lang="en-GB" dirty="0"/>
+          </a:p>
+          <a:p>
+            <a:r>
+              <a:rPr lang="en-GB" dirty="0"/>
+              <a:t>Human Fertility Collection: </a:t>
+            </a:r>
+            <a:r>
+              <a:rPr lang="en-GB" dirty="0">
+                <a:hlinkClick r:id="rId3"/>
+              </a:rPr>
+              <a:t>http://www.fertilitydata.org</a:t>
+            </a:r>
+            <a:r>
+              <a:rPr lang="en-GB" dirty="0" smtClean="0">
+                <a:hlinkClick r:id="rId3"/>
+              </a:rPr>
+              <a:t>/</a:t>
+            </a:r>
+            <a:endParaRPr lang="en-GB" dirty="0" smtClean="0"/>
+          </a:p>
+          <a:p>
+            <a:r>
+              <a:rPr lang="en-GB" dirty="0"/>
+              <a:t>Preferential ‘munging’ of the two:</a:t>
+            </a:r>
+          </a:p>
+          <a:p>
+            <a:pPr lvl="1"/>
+            <a:r>
+              <a:rPr lang="en-GB" i="1" dirty="0" smtClean="0"/>
+              <a:t>1) HFD</a:t>
+            </a:r>
+            <a:r>
+              <a:rPr lang="en-GB" i="1" dirty="0"/>
+              <a:t>; </a:t>
+            </a:r>
+          </a:p>
+          <a:p>
+            <a:pPr lvl="1"/>
+            <a:r>
+              <a:rPr lang="en-GB" i="1" dirty="0"/>
+              <a:t>2) HFC: </a:t>
+            </a:r>
+          </a:p>
+          <a:p>
+            <a:pPr lvl="2"/>
+            <a:r>
+              <a:rPr lang="en-GB" dirty="0" err="1"/>
+              <a:t>i</a:t>
+            </a:r>
+            <a:r>
+              <a:rPr lang="en-GB" dirty="0"/>
+              <a:t>) STAT: Official statistical data : Data that come from statistical publications and official websites of national statistical offices </a:t>
+            </a:r>
+          </a:p>
+          <a:p>
+            <a:pPr lvl="2"/>
+            <a:r>
+              <a:rPr lang="en-GB" dirty="0"/>
+              <a:t>ii) ODE: European Demographic Observatory (</a:t>
+            </a:r>
+            <a:r>
+              <a:rPr lang="en-GB" dirty="0" err="1"/>
+              <a:t>L'Observatoire</a:t>
+            </a:r>
+            <a:r>
+              <a:rPr lang="en-GB" dirty="0"/>
+              <a:t> </a:t>
+            </a:r>
+            <a:r>
+              <a:rPr lang="en-GB" dirty="0" err="1"/>
+              <a:t>Démographique</a:t>
+            </a:r>
+            <a:r>
+              <a:rPr lang="en-GB" dirty="0"/>
+              <a:t> </a:t>
+            </a:r>
+            <a:r>
+              <a:rPr lang="en-GB" dirty="0" err="1"/>
+              <a:t>Européen</a:t>
+            </a:r>
+            <a:r>
+              <a:rPr lang="en-GB" dirty="0"/>
+              <a:t>)</a:t>
+            </a:r>
+          </a:p>
+          <a:p>
+            <a:r>
+              <a:rPr lang="en-GB" dirty="0"/>
+              <a:t>Reference: </a:t>
+            </a:r>
+            <a:r>
+              <a:rPr lang="en-GB" u="sng" dirty="0">
+                <a:hlinkClick r:id="rId4"/>
+              </a:rPr>
+              <a:t>http://www.fertilitydata.org/cgi-bin/collections.php</a:t>
+            </a:r>
+            <a:endParaRPr lang="en-GB" dirty="0"/>
+          </a:p>
+          <a:p>
+            <a:r>
+              <a:rPr lang="en-GB" dirty="0"/>
+              <a:t>Additional ‘munging</a:t>
+            </a:r>
+            <a:r>
+              <a:rPr lang="en-GB" dirty="0" smtClean="0"/>
+              <a:t>’ to impute ASMRs in more recent missing years</a:t>
+            </a:r>
+          </a:p>
+          <a:p>
+            <a:endParaRPr lang="en-GB" b="1" dirty="0"/>
+          </a:p>
+          <a:p>
+            <a:endParaRPr lang="en-GB" dirty="0"/>
+          </a:p>
+        </p:txBody>
+      </p:sp>
+    </p:spTree>
+    <p:extLst>
+      <p:ext uri="{BB962C8B-B14F-4D97-AF65-F5344CB8AC3E}">
+        <p14:creationId xmlns:p14="http://schemas.microsoft.com/office/powerpoint/2010/main" val="2016109930"/>
+      </p:ext>
+    </p:extLst>
+  </p:cSld>
+  <p:clrMapOvr>
+    <a:masterClrMapping/>
+  </p:clrMapOvr>
+  <p:timing>
+    <p:tnLst>
+      <p:par>
+        <p:cTn id="1" dur="indefinite" restart="never" nodeType="tmRoot"/>
+      </p:par>
+    </p:tnLst>
+  </p:timing>
+</p:sld>
+</file>
+
+<file path=ppt/slides/slide12.xml><?xml version="1.0" encoding="utf-8"?>
+<p:sld xmlns:a="http://schemas.openxmlformats.org/drawingml/2006/main" xmlns:r="http://schemas.openxmlformats.org/officeDocument/2006/relationships" xmlns:p="http://schemas.openxmlformats.org/presentationml/2006/main">
+  <p:cSld>
+    <p:spTree>
+      <p:nvGrpSpPr>
+        <p:cNvPr id="1" name=""/>
+        <p:cNvGrpSpPr/>
+        <p:nvPr/>
+      </p:nvGrpSpPr>
+      <p:grpSpPr>
+        <a:xfrm>
+          <a:off x="0" y="0"/>
+          <a:ext cx="0" cy="0"/>
+          <a:chOff x="0" y="0"/>
+          <a:chExt cx="0" cy="0"/>
+        </a:xfrm>
+      </p:grpSpPr>
+      <p:sp>
+        <p:nvSpPr>
+          <p:cNvPr id="2" name="Title 1"/>
+          <p:cNvSpPr>
+            <a:spLocks noGrp="1"/>
+          </p:cNvSpPr>
+          <p:nvPr>
+            <p:ph type="title"/>
+          </p:nvPr>
+        </p:nvSpPr>
+        <p:spPr/>
+        <p:txBody>
+          <a:bodyPr/>
+          <a:lstStyle/>
+          <a:p>
+            <a:r>
+              <a:rPr lang="en-GB" dirty="0" smtClean="0"/>
+              <a:t>Methods: Software</a:t>
+            </a:r>
+            <a:endParaRPr lang="en-GB" dirty="0"/>
+          </a:p>
+        </p:txBody>
+      </p:sp>
+      <p:sp>
+        <p:nvSpPr>
+          <p:cNvPr id="3" name="Content Placeholder 2"/>
+          <p:cNvSpPr>
+            <a:spLocks noGrp="1"/>
+          </p:cNvSpPr>
+          <p:nvPr>
+            <p:ph idx="1"/>
+          </p:nvPr>
+        </p:nvSpPr>
+        <p:spPr/>
+        <p:txBody>
+          <a:bodyPr>
+            <a:normAutofit/>
+          </a:bodyPr>
+          <a:lstStyle/>
+          <a:p>
+            <a:r>
+              <a:rPr lang="en-GB" dirty="0" smtClean="0"/>
+              <a:t>R with </a:t>
+            </a:r>
+            <a:r>
+              <a:rPr lang="en-GB" dirty="0" err="1" smtClean="0"/>
+              <a:t>Github</a:t>
+            </a:r>
+            <a:endParaRPr lang="en-GB" dirty="0" smtClean="0"/>
+          </a:p>
+          <a:p>
+            <a:r>
+              <a:rPr lang="en-GB" dirty="0"/>
+              <a:t>R packages: </a:t>
+            </a:r>
+          </a:p>
+          <a:p>
+            <a:pPr lvl="1"/>
+            <a:r>
+              <a:rPr lang="en-GB" i="1" dirty="0"/>
+              <a:t>Lattice/</a:t>
+            </a:r>
+            <a:r>
+              <a:rPr lang="en-GB" i="1" dirty="0" err="1"/>
+              <a:t>LatticeExtra</a:t>
+            </a:r>
+            <a:r>
+              <a:rPr lang="en-GB" i="1" dirty="0"/>
+              <a:t>: main maps</a:t>
+            </a:r>
+          </a:p>
+          <a:p>
+            <a:pPr lvl="1"/>
+            <a:r>
+              <a:rPr lang="en-GB" i="1" dirty="0"/>
+              <a:t>R2stl: 3D printable STL files (HFD only)</a:t>
+            </a:r>
+          </a:p>
+          <a:p>
+            <a:pPr lvl="1"/>
+            <a:r>
+              <a:rPr lang="en-GB" i="1" dirty="0" err="1"/>
+              <a:t>Wickhamese</a:t>
+            </a:r>
+            <a:r>
+              <a:rPr lang="en-GB" i="1" dirty="0"/>
+              <a:t> packages – </a:t>
+            </a:r>
+            <a:r>
+              <a:rPr lang="en-GB" i="1" dirty="0" err="1"/>
+              <a:t>readr</a:t>
+            </a:r>
+            <a:r>
+              <a:rPr lang="en-GB" i="1" dirty="0"/>
+              <a:t>, </a:t>
+            </a:r>
+            <a:r>
+              <a:rPr lang="en-GB" i="1" dirty="0" err="1"/>
+              <a:t>tidyr</a:t>
+            </a:r>
+            <a:r>
+              <a:rPr lang="en-GB" i="1" dirty="0"/>
+              <a:t>, </a:t>
+            </a:r>
+            <a:r>
+              <a:rPr lang="en-GB" i="1" dirty="0" err="1"/>
+              <a:t>stringr</a:t>
+            </a:r>
+            <a:r>
+              <a:rPr lang="en-GB" i="1" dirty="0"/>
+              <a:t>, </a:t>
+            </a:r>
+            <a:r>
+              <a:rPr lang="en-GB" i="1" dirty="0" err="1"/>
+              <a:t>dplyr</a:t>
+            </a:r>
+            <a:r>
+              <a:rPr lang="en-GB" i="1" dirty="0"/>
+              <a:t>, purr – for general data management and automation</a:t>
+            </a:r>
+          </a:p>
+          <a:p>
+            <a:r>
+              <a:rPr lang="en-GB" dirty="0" err="1"/>
+              <a:t>Github</a:t>
+            </a:r>
+            <a:endParaRPr lang="en-GB" dirty="0"/>
+          </a:p>
+          <a:p>
+            <a:pPr lvl="1"/>
+            <a:r>
+              <a:rPr lang="en-GB" i="1" u="sng" dirty="0">
+                <a:hlinkClick r:id="rId2"/>
+              </a:rPr>
+              <a:t>https://github.com/JonMinton/comparative_fertility/</a:t>
+            </a:r>
+            <a:endParaRPr lang="en-GB" i="1" dirty="0"/>
+          </a:p>
+          <a:p>
+            <a:pPr lvl="1"/>
+            <a:r>
+              <a:rPr lang="en-GB" i="1" u="sng" dirty="0">
+                <a:hlinkClick r:id="rId3"/>
+              </a:rPr>
+              <a:t>https://github.com/JonMinton/Statistical_Sculpture/</a:t>
+            </a:r>
+            <a:endParaRPr lang="en-GB" i="1" dirty="0"/>
+          </a:p>
+          <a:p>
+            <a:endParaRPr lang="en-GB" dirty="0"/>
+          </a:p>
+        </p:txBody>
+      </p:sp>
+    </p:spTree>
+    <p:extLst>
+      <p:ext uri="{BB962C8B-B14F-4D97-AF65-F5344CB8AC3E}">
+        <p14:creationId xmlns:p14="http://schemas.microsoft.com/office/powerpoint/2010/main" val="2997106009"/>
+      </p:ext>
+    </p:extLst>
+  </p:cSld>
+  <p:clrMapOvr>
+    <a:masterClrMapping/>
+  </p:clrMapOvr>
+  <p:timing>
+    <p:tnLst>
+      <p:par>
+        <p:cTn id="1" dur="indefinite" restart="never" nodeType="tmRoot"/>
+      </p:par>
+    </p:tnLst>
+  </p:timing>
+</p:sld>
+</file>
+
+<file path=ppt/slides/slide13.xml><?xml version="1.0" encoding="utf-8"?>
+<p:sld xmlns:a="http://schemas.openxmlformats.org/drawingml/2006/main" xmlns:r="http://schemas.openxmlformats.org/officeDocument/2006/relationships" xmlns:p="http://schemas.openxmlformats.org/presentationml/2006/main">
+  <p:cSld>
+    <p:spTree>
+      <p:nvGrpSpPr>
+        <p:cNvPr id="1" name=""/>
+        <p:cNvGrpSpPr/>
+        <p:nvPr/>
+      </p:nvGrpSpPr>
+      <p:grpSpPr>
+        <a:xfrm>
+          <a:off x="0" y="0"/>
+          <a:ext cx="0" cy="0"/>
+          <a:chOff x="0" y="0"/>
+          <a:chExt cx="0" cy="0"/>
+        </a:xfrm>
+      </p:grpSpPr>
+      <p:sp>
+        <p:nvSpPr>
+          <p:cNvPr id="2" name="Title 1"/>
+          <p:cNvSpPr>
+            <a:spLocks noGrp="1"/>
+          </p:cNvSpPr>
+          <p:nvPr>
+            <p:ph type="title"/>
+          </p:nvPr>
+        </p:nvSpPr>
+        <p:spPr/>
+        <p:txBody>
+          <a:bodyPr/>
+          <a:lstStyle/>
+          <a:p>
+            <a:r>
+              <a:rPr lang="en-GB" dirty="0" smtClean="0"/>
+              <a:t>Methods: Producing cumulative cohort fertility rates</a:t>
+            </a:r>
+            <a:endParaRPr lang="en-GB" dirty="0"/>
+          </a:p>
+        </p:txBody>
+      </p:sp>
+      <p:sp>
+        <p:nvSpPr>
+          <p:cNvPr id="3" name="Content Placeholder 2"/>
+          <p:cNvSpPr>
+            <a:spLocks noGrp="1"/>
+          </p:cNvSpPr>
+          <p:nvPr>
+            <p:ph idx="1"/>
+          </p:nvPr>
+        </p:nvSpPr>
+        <p:spPr/>
+        <p:txBody>
+          <a:bodyPr>
+            <a:normAutofit/>
+          </a:bodyPr>
+          <a:lstStyle/>
+          <a:p>
+            <a:r>
+              <a:rPr lang="en-GB" dirty="0"/>
+              <a:t>Given ASFRs, at what age do different birth cohorts ‘achieve’ a given number of children? </a:t>
+            </a:r>
+          </a:p>
+          <a:p>
+            <a:r>
+              <a:rPr lang="en-GB" dirty="0"/>
+              <a:t>CCFRs of 1.30, 1.50, 1.80, and 2.05 are highlighted as contours</a:t>
+            </a:r>
+          </a:p>
+          <a:p>
+            <a:pPr lvl="1"/>
+            <a:r>
+              <a:rPr lang="en-GB" i="1" dirty="0"/>
+              <a:t>2.05 = ‘replacement fertility levels’</a:t>
+            </a:r>
+          </a:p>
+          <a:p>
+            <a:pPr lvl="1"/>
+            <a:r>
+              <a:rPr lang="en-GB" i="1" dirty="0"/>
+              <a:t>The 1.30 line always below 1.50 line, 1.50 below 1.80, 1.80 below 2.05</a:t>
+            </a:r>
+          </a:p>
+          <a:p>
+            <a:pPr lvl="1"/>
+            <a:r>
+              <a:rPr lang="en-GB" i="1" dirty="0"/>
+              <a:t>If a contour line is not visible for a particular birth cohort, that birth cohort did not achieve that cumulative fertility rate</a:t>
+            </a:r>
+          </a:p>
+          <a:p>
+            <a:pPr lvl="1"/>
+            <a:r>
+              <a:rPr lang="en-GB" i="1" dirty="0"/>
+              <a:t>If 2.05 line not visible: long term ageing and declining population</a:t>
+            </a:r>
+          </a:p>
+          <a:p>
+            <a:r>
+              <a:rPr lang="en-GB" dirty="0"/>
+              <a:t>For the final </a:t>
+            </a:r>
+            <a:r>
+              <a:rPr lang="en-GB" dirty="0" err="1"/>
+              <a:t>latticeplot</a:t>
+            </a:r>
+            <a:r>
+              <a:rPr lang="en-GB" dirty="0"/>
+              <a:t> – country tiles are coloured by region, and arranged by fertility rate in last year</a:t>
+            </a:r>
+          </a:p>
+          <a:p>
+            <a:endParaRPr lang="en-GB" dirty="0"/>
+          </a:p>
+        </p:txBody>
+      </p:sp>
+    </p:spTree>
+    <p:extLst>
+      <p:ext uri="{BB962C8B-B14F-4D97-AF65-F5344CB8AC3E}">
+        <p14:creationId xmlns:p14="http://schemas.microsoft.com/office/powerpoint/2010/main" val="1912555029"/>
+      </p:ext>
+    </p:extLst>
+  </p:cSld>
+  <p:clrMapOvr>
+    <a:masterClrMapping/>
+  </p:clrMapOvr>
+  <p:timing>
+    <p:tnLst>
+      <p:par>
+        <p:cTn id="1" dur="indefinite" restart="never" nodeType="tmRoot"/>
+      </p:par>
+    </p:tnLst>
+  </p:timing>
+</p:sld>
+</file>
+
+<file path=ppt/slides/slide14.xml><?xml version="1.0" encoding="utf-8"?>
+<p:sld xmlns:a="http://schemas.openxmlformats.org/drawingml/2006/main" xmlns:r="http://schemas.openxmlformats.org/officeDocument/2006/relationships" xmlns:p="http://schemas.openxmlformats.org/presentationml/2006/main">
+  <p:cSld>
+    <p:spTree>
+      <p:nvGrpSpPr>
+        <p:cNvPr id="1" name=""/>
+        <p:cNvGrpSpPr/>
+        <p:nvPr/>
+      </p:nvGrpSpPr>
+      <p:grpSpPr>
+        <a:xfrm>
+          <a:off x="0" y="0"/>
+          <a:ext cx="0" cy="0"/>
+          <a:chOff x="0" y="0"/>
+          <a:chExt cx="0" cy="0"/>
+        </a:xfrm>
+      </p:grpSpPr>
+      <p:sp>
+        <p:nvSpPr>
+          <p:cNvPr id="2" name="Title 1"/>
+          <p:cNvSpPr>
+            <a:spLocks noGrp="1"/>
+          </p:cNvSpPr>
+          <p:nvPr>
+            <p:ph type="title"/>
+          </p:nvPr>
+        </p:nvSpPr>
+        <p:spPr/>
+        <p:txBody>
+          <a:bodyPr/>
+          <a:lstStyle/>
+          <a:p>
+            <a:r>
+              <a:rPr lang="en-GB" dirty="0" smtClean="0"/>
+              <a:t>Methods: Graphs produced</a:t>
+            </a:r>
+            <a:endParaRPr lang="en-GB" dirty="0"/>
+          </a:p>
+        </p:txBody>
+      </p:sp>
+      <p:sp>
+        <p:nvSpPr>
+          <p:cNvPr id="3" name="Content Placeholder 2"/>
+          <p:cNvSpPr>
+            <a:spLocks noGrp="1"/>
+          </p:cNvSpPr>
+          <p:nvPr>
+            <p:ph idx="1"/>
+          </p:nvPr>
+        </p:nvSpPr>
+        <p:spPr/>
+        <p:txBody>
+          <a:bodyPr/>
+          <a:lstStyle/>
+          <a:p>
+            <a:r>
+              <a:rPr lang="en-GB" dirty="0" err="1" smtClean="0"/>
+              <a:t>Heatmaps</a:t>
+            </a:r>
+            <a:r>
+              <a:rPr lang="en-GB" dirty="0" smtClean="0"/>
+              <a:t>/level plots of ASMRs given age and year</a:t>
+            </a:r>
+          </a:p>
+          <a:p>
+            <a:r>
+              <a:rPr lang="en-GB" dirty="0" smtClean="0"/>
+              <a:t>Contour maps of ASMRs given age and year</a:t>
+            </a:r>
+          </a:p>
+          <a:p>
+            <a:r>
+              <a:rPr lang="en-GB" dirty="0" err="1" smtClean="0"/>
+              <a:t>Heatmaps</a:t>
+            </a:r>
+            <a:r>
+              <a:rPr lang="en-GB" dirty="0" smtClean="0"/>
+              <a:t>/level plots of ASMRs given age and birth year</a:t>
+            </a:r>
+          </a:p>
+          <a:p>
+            <a:r>
+              <a:rPr lang="en-GB" dirty="0" smtClean="0"/>
+              <a:t>Cumulative cohort fertility maps</a:t>
+            </a:r>
+          </a:p>
+          <a:p>
+            <a:pPr lvl="1"/>
+            <a:r>
+              <a:rPr lang="en-GB" dirty="0" smtClean="0"/>
+              <a:t>Contours giving CCFRs, colour/shade giving ASMRs</a:t>
+            </a:r>
+          </a:p>
+          <a:p>
+            <a:r>
+              <a:rPr lang="en-GB" dirty="0" smtClean="0"/>
+              <a:t>CCFR </a:t>
+            </a:r>
+            <a:r>
+              <a:rPr lang="en-GB" dirty="0" err="1" smtClean="0"/>
+              <a:t>latticeplot</a:t>
+            </a:r>
+            <a:r>
+              <a:rPr lang="en-GB" dirty="0" smtClean="0"/>
+              <a:t> for all countries</a:t>
+            </a:r>
+            <a:endParaRPr lang="en-GB" dirty="0"/>
+          </a:p>
+        </p:txBody>
+      </p:sp>
+    </p:spTree>
+    <p:extLst>
+      <p:ext uri="{BB962C8B-B14F-4D97-AF65-F5344CB8AC3E}">
+        <p14:creationId xmlns:p14="http://schemas.microsoft.com/office/powerpoint/2010/main" val="2138249116"/>
+      </p:ext>
+    </p:extLst>
+  </p:cSld>
+  <p:clrMapOvr>
+    <a:masterClrMapping/>
+  </p:clrMapOvr>
+  <p:timing>
+    <p:tnLst>
+      <p:par>
+        <p:cTn id="1" dur="indefinite" restart="never" nodeType="tmRoot"/>
+      </p:par>
+    </p:tnLst>
+  </p:timing>
+</p:sld>
+</file>
+
+<file path=ppt/slides/slide15.xml><?xml version="1.0" encoding="utf-8"?>
+<p:sld xmlns:a="http://schemas.openxmlformats.org/drawingml/2006/main" xmlns:r="http://schemas.openxmlformats.org/officeDocument/2006/relationships" xmlns:p="http://schemas.openxmlformats.org/presentationml/2006/main">
+  <p:cSld>
+    <p:spTree>
+      <p:nvGrpSpPr>
+        <p:cNvPr id="1" name=""/>
+        <p:cNvGrpSpPr/>
+        <p:nvPr/>
+      </p:nvGrpSpPr>
+      <p:grpSpPr>
+        <a:xfrm>
+          <a:off x="0" y="0"/>
+          <a:ext cx="0" cy="0"/>
+          <a:chOff x="0" y="0"/>
+          <a:chExt cx="0" cy="0"/>
+        </a:xfrm>
+      </p:grpSpPr>
+      <p:sp>
+        <p:nvSpPr>
+          <p:cNvPr id="2" name="Title 1"/>
+          <p:cNvSpPr>
+            <a:spLocks noGrp="1"/>
+          </p:cNvSpPr>
+          <p:nvPr>
+            <p:ph type="title"/>
+          </p:nvPr>
+        </p:nvSpPr>
+        <p:spPr/>
+        <p:txBody>
+          <a:bodyPr/>
+          <a:lstStyle/>
+          <a:p>
+            <a:r>
+              <a:rPr lang="en-GB" dirty="0" smtClean="0"/>
+              <a:t>Results</a:t>
+            </a:r>
+            <a:endParaRPr lang="en-GB" dirty="0"/>
+          </a:p>
+        </p:txBody>
+      </p:sp>
+      <p:sp>
+        <p:nvSpPr>
+          <p:cNvPr id="3" name="Content Placeholder 2"/>
+          <p:cNvSpPr>
+            <a:spLocks noGrp="1"/>
+          </p:cNvSpPr>
+          <p:nvPr>
+            <p:ph idx="1"/>
+          </p:nvPr>
+        </p:nvSpPr>
+        <p:spPr/>
+        <p:txBody>
+          <a:bodyPr/>
+          <a:lstStyle/>
+          <a:p>
+            <a:endParaRPr lang="en-GB" dirty="0"/>
+          </a:p>
+        </p:txBody>
+      </p:sp>
+    </p:spTree>
+    <p:extLst>
+      <p:ext uri="{BB962C8B-B14F-4D97-AF65-F5344CB8AC3E}">
+        <p14:creationId xmlns:p14="http://schemas.microsoft.com/office/powerpoint/2010/main" val="2522421706"/>
+      </p:ext>
+    </p:extLst>
+  </p:cSld>
+  <p:clrMapOvr>
+    <a:masterClrMapping/>
+  </p:clrMapOvr>
+  <p:timing>
+    <p:tnLst>
+      <p:par>
+        <p:cTn id="1" dur="indefinite" restart="never" nodeType="tmRoot"/>
+      </p:par>
+    </p:tnLst>
+  </p:timing>
+</p:sld>
+</file>
+
+<file path=ppt/slides/slide16.xml><?xml version="1.0" encoding="utf-8"?>
+<p:sld xmlns:a="http://schemas.openxmlformats.org/drawingml/2006/main" xmlns:r="http://schemas.openxmlformats.org/officeDocument/2006/relationships" xmlns:p="http://schemas.openxmlformats.org/presentationml/2006/main">
+  <p:cSld>
+    <p:spTree>
+      <p:nvGrpSpPr>
+        <p:cNvPr id="1" name=""/>
+        <p:cNvGrpSpPr/>
+        <p:nvPr/>
+      </p:nvGrpSpPr>
+      <p:grpSpPr>
+        <a:xfrm>
+          <a:off x="0" y="0"/>
+          <a:ext cx="0" cy="0"/>
+          <a:chOff x="0" y="0"/>
+          <a:chExt cx="0" cy="0"/>
+        </a:xfrm>
+      </p:grpSpPr>
+      <p:pic>
+        <p:nvPicPr>
+          <p:cNvPr id="4" name="Content Placeholder 3"/>
+          <p:cNvPicPr>
+            <a:picLocks noGrp="1" noChangeAspect="1"/>
+          </p:cNvPicPr>
+          <p:nvPr>
+            <p:ph idx="1"/>
+          </p:nvPr>
+        </p:nvPicPr>
+        <p:blipFill rotWithShape="1">
+          <a:blip r:embed="rId2" cstate="print">
+            <a:extLst>
+              <a:ext uri="{28A0092B-C50C-407E-A947-70E740481C1C}">
+                <a14:useLocalDpi xmlns:a14="http://schemas.microsoft.com/office/drawing/2010/main" val="0"/>
+              </a:ext>
+            </a:extLst>
+          </a:blip>
+          <a:srcRect t="11768" b="13497"/>
+          <a:stretch/>
+        </p:blipFill>
+        <p:spPr>
+          <a:xfrm>
+            <a:off x="196589" y="3557016"/>
+            <a:ext cx="5398019" cy="3227832"/>
+          </a:xfrm>
+        </p:spPr>
+      </p:pic>
+      <p:pic>
+        <p:nvPicPr>
+          <p:cNvPr id="5" name="Picture 4"/>
+          <p:cNvPicPr>
+            <a:picLocks noChangeAspect="1"/>
+          </p:cNvPicPr>
+          <p:nvPr/>
+        </p:nvPicPr>
+        <p:blipFill rotWithShape="1">
+          <a:blip r:embed="rId3" cstate="print">
+            <a:extLst>
+              <a:ext uri="{28A0092B-C50C-407E-A947-70E740481C1C}">
+                <a14:useLocalDpi xmlns:a14="http://schemas.microsoft.com/office/drawing/2010/main" val="0"/>
+              </a:ext>
+            </a:extLst>
+          </a:blip>
+          <a:srcRect t="10921" b="12651"/>
+          <a:stretch/>
+        </p:blipFill>
+        <p:spPr>
+          <a:xfrm>
+            <a:off x="6644640" y="3557016"/>
+            <a:ext cx="5398019" cy="3300984"/>
+          </a:xfrm>
+          <a:prstGeom prst="rect">
+            <a:avLst/>
+          </a:prstGeom>
+        </p:spPr>
+      </p:pic>
+      <p:pic>
+        <p:nvPicPr>
+          <p:cNvPr id="6" name="Picture 5"/>
+          <p:cNvPicPr>
+            <a:picLocks noChangeAspect="1"/>
+          </p:cNvPicPr>
+          <p:nvPr/>
+        </p:nvPicPr>
+        <p:blipFill rotWithShape="1">
+          <a:blip r:embed="rId4" cstate="print">
+            <a:extLst>
+              <a:ext uri="{28A0092B-C50C-407E-A947-70E740481C1C}">
+                <a14:useLocalDpi xmlns:a14="http://schemas.microsoft.com/office/drawing/2010/main" val="0"/>
+              </a:ext>
+            </a:extLst>
+          </a:blip>
+          <a:srcRect t="11045" b="13373"/>
+          <a:stretch/>
+        </p:blipFill>
+        <p:spPr>
+          <a:xfrm>
+            <a:off x="6644639" y="18288"/>
+            <a:ext cx="5398019" cy="3264408"/>
+          </a:xfrm>
+          <a:prstGeom prst="rect">
+            <a:avLst/>
+          </a:prstGeom>
+        </p:spPr>
+      </p:pic>
+      <p:pic>
+        <p:nvPicPr>
+          <p:cNvPr id="8" name="Picture 7"/>
+          <p:cNvPicPr>
+            <a:picLocks noChangeAspect="1"/>
+          </p:cNvPicPr>
+          <p:nvPr/>
+        </p:nvPicPr>
+        <p:blipFill rotWithShape="1">
+          <a:blip r:embed="rId5" cstate="print">
+            <a:extLst>
+              <a:ext uri="{28A0092B-C50C-407E-A947-70E740481C1C}">
+                <a14:useLocalDpi xmlns:a14="http://schemas.microsoft.com/office/drawing/2010/main" val="0"/>
+              </a:ext>
+            </a:extLst>
+          </a:blip>
+          <a:srcRect t="11680" b="13162"/>
+          <a:stretch/>
+        </p:blipFill>
+        <p:spPr>
+          <a:xfrm>
+            <a:off x="196590" y="18288"/>
+            <a:ext cx="5398019" cy="3246120"/>
+          </a:xfrm>
+          <a:prstGeom prst="rect">
+            <a:avLst/>
+          </a:prstGeom>
+        </p:spPr>
+      </p:pic>
+    </p:spTree>
+    <p:extLst>
+      <p:ext uri="{BB962C8B-B14F-4D97-AF65-F5344CB8AC3E}">
+        <p14:creationId xmlns:p14="http://schemas.microsoft.com/office/powerpoint/2010/main" val="3553798435"/>
+      </p:ext>
+    </p:extLst>
+  </p:cSld>
+  <p:clrMapOvr>
+    <a:masterClrMapping/>
+  </p:clrMapOvr>
+  <p:timing>
+    <p:tnLst>
+      <p:par>
+        <p:cTn id="1" dur="indefinite" restart="never" nodeType="tmRoot"/>
+      </p:par>
+    </p:tnLst>
+  </p:timing>
+</p:sld>
+</file>
+
+<file path=ppt/slides/slide17.xml><?xml version="1.0" encoding="utf-8"?>
+<p:sld xmlns:a="http://schemas.openxmlformats.org/drawingml/2006/main" xmlns:r="http://schemas.openxmlformats.org/officeDocument/2006/relationships" xmlns:p="http://schemas.openxmlformats.org/presentationml/2006/main">
+  <p:cSld>
+    <p:spTree>
+      <p:nvGrpSpPr>
+        <p:cNvPr id="1" name=""/>
+        <p:cNvGrpSpPr/>
+        <p:nvPr/>
+      </p:nvGrpSpPr>
+      <p:grpSpPr>
+        <a:xfrm>
+          <a:off x="0" y="0"/>
+          <a:ext cx="0" cy="0"/>
+          <a:chOff x="0" y="0"/>
+          <a:chExt cx="0" cy="0"/>
+        </a:xfrm>
+      </p:grpSpPr>
+      <p:pic>
+        <p:nvPicPr>
+          <p:cNvPr id="4" name="Content Placeholder 3"/>
+          <p:cNvPicPr>
+            <a:picLocks noGrp="1" noChangeAspect="1"/>
+          </p:cNvPicPr>
+          <p:nvPr>
+            <p:ph idx="1"/>
+          </p:nvPr>
+        </p:nvPicPr>
+        <p:blipFill rotWithShape="1">
+          <a:blip r:embed="rId2" cstate="print">
+            <a:extLst>
+              <a:ext uri="{28A0092B-C50C-407E-A947-70E740481C1C}">
+                <a14:useLocalDpi xmlns:a14="http://schemas.microsoft.com/office/drawing/2010/main" val="0"/>
+              </a:ext>
+            </a:extLst>
+          </a:blip>
+          <a:srcRect t="11644" b="13832"/>
+          <a:stretch/>
+        </p:blipFill>
+        <p:spPr>
+          <a:xfrm>
+            <a:off x="123438" y="155449"/>
+            <a:ext cx="5398019" cy="3218688"/>
+          </a:xfrm>
+        </p:spPr>
+      </p:pic>
+      <p:pic>
+        <p:nvPicPr>
+          <p:cNvPr id="5" name="Picture 4"/>
+          <p:cNvPicPr>
+            <a:picLocks noChangeAspect="1"/>
+          </p:cNvPicPr>
+          <p:nvPr/>
+        </p:nvPicPr>
+        <p:blipFill rotWithShape="1">
+          <a:blip r:embed="rId3" cstate="print">
+            <a:extLst>
+              <a:ext uri="{28A0092B-C50C-407E-A947-70E740481C1C}">
+                <a14:useLocalDpi xmlns:a14="http://schemas.microsoft.com/office/drawing/2010/main" val="0"/>
+              </a:ext>
+            </a:extLst>
+          </a:blip>
+          <a:srcRect t="12527" b="14008"/>
+          <a:stretch/>
+        </p:blipFill>
+        <p:spPr>
+          <a:xfrm>
+            <a:off x="6505950" y="155449"/>
+            <a:ext cx="5398019" cy="3172968"/>
+          </a:xfrm>
+          <a:prstGeom prst="rect">
+            <a:avLst/>
+          </a:prstGeom>
+        </p:spPr>
+      </p:pic>
+      <p:pic>
+        <p:nvPicPr>
+          <p:cNvPr id="6" name="Picture 5"/>
+          <p:cNvPicPr>
+            <a:picLocks noChangeAspect="1"/>
+          </p:cNvPicPr>
+          <p:nvPr/>
+        </p:nvPicPr>
+        <p:blipFill rotWithShape="1">
+          <a:blip r:embed="rId4" cstate="print">
+            <a:extLst>
+              <a:ext uri="{28A0092B-C50C-407E-A947-70E740481C1C}">
+                <a14:useLocalDpi xmlns:a14="http://schemas.microsoft.com/office/drawing/2010/main" val="0"/>
+              </a:ext>
+            </a:extLst>
+          </a:blip>
+          <a:srcRect t="11679" b="14008"/>
+          <a:stretch/>
+        </p:blipFill>
+        <p:spPr>
+          <a:xfrm>
+            <a:off x="123438" y="3328417"/>
+            <a:ext cx="5398019" cy="3209544"/>
+          </a:xfrm>
+          <a:prstGeom prst="rect">
+            <a:avLst/>
+          </a:prstGeom>
+        </p:spPr>
+      </p:pic>
+      <p:pic>
+        <p:nvPicPr>
+          <p:cNvPr id="7" name="Picture 6"/>
+          <p:cNvPicPr>
+            <a:picLocks noChangeAspect="1"/>
+          </p:cNvPicPr>
+          <p:nvPr/>
+        </p:nvPicPr>
+        <p:blipFill rotWithShape="1">
+          <a:blip r:embed="rId5" cstate="print">
+            <a:extLst>
+              <a:ext uri="{28A0092B-C50C-407E-A947-70E740481C1C}">
+                <a14:useLocalDpi xmlns:a14="http://schemas.microsoft.com/office/drawing/2010/main" val="0"/>
+              </a:ext>
+            </a:extLst>
+          </a:blip>
+          <a:srcRect t="12315" b="13585"/>
+          <a:stretch/>
+        </p:blipFill>
+        <p:spPr>
+          <a:xfrm>
+            <a:off x="6505950" y="3374137"/>
+            <a:ext cx="5398019" cy="3200400"/>
+          </a:xfrm>
+          <a:prstGeom prst="rect">
+            <a:avLst/>
+          </a:prstGeom>
+        </p:spPr>
+      </p:pic>
+    </p:spTree>
+    <p:extLst>
+      <p:ext uri="{BB962C8B-B14F-4D97-AF65-F5344CB8AC3E}">
+        <p14:creationId xmlns:p14="http://schemas.microsoft.com/office/powerpoint/2010/main" val="4096741110"/>
+      </p:ext>
+    </p:extLst>
+  </p:cSld>
+  <p:clrMapOvr>
+    <a:masterClrMapping/>
+  </p:clrMapOvr>
+  <p:timing>
+    <p:tnLst>
+      <p:par>
+        <p:cTn id="1" dur="indefinite" restart="never" nodeType="tmRoot"/>
+      </p:par>
+    </p:tnLst>
+  </p:timing>
+</p:sld>
+</file>
+
+<file path=ppt/slides/slide18.xml><?xml version="1.0" encoding="utf-8"?>
+<p:sld xmlns:a="http://schemas.openxmlformats.org/drawingml/2006/main" xmlns:r="http://schemas.openxmlformats.org/officeDocument/2006/relationships" xmlns:p="http://schemas.openxmlformats.org/presentationml/2006/main">
+  <p:cSld>
+    <p:spTree>
+      <p:nvGrpSpPr>
+        <p:cNvPr id="1" name=""/>
+        <p:cNvGrpSpPr/>
+        <p:nvPr/>
+      </p:nvGrpSpPr>
+      <p:grpSpPr>
+        <a:xfrm>
+          <a:off x="0" y="0"/>
+          <a:ext cx="0" cy="0"/>
+          <a:chOff x="0" y="0"/>
+          <a:chExt cx="0" cy="0"/>
+        </a:xfrm>
+      </p:grpSpPr>
+      <p:pic>
+        <p:nvPicPr>
+          <p:cNvPr id="4" name="Picture 3"/>
+          <p:cNvPicPr>
+            <a:picLocks noChangeAspect="1"/>
+          </p:cNvPicPr>
+          <p:nvPr/>
+        </p:nvPicPr>
+        <p:blipFill>
+          <a:blip r:embed="rId2" cstate="print">
+            <a:extLst>
+              <a:ext uri="{28A0092B-C50C-407E-A947-70E740481C1C}">
+                <a14:useLocalDpi xmlns:a14="http://schemas.microsoft.com/office/drawing/2010/main" val="0"/>
+              </a:ext>
+            </a:extLst>
+          </a:blip>
+          <a:stretch>
+            <a:fillRect/>
+          </a:stretch>
+        </p:blipFill>
+        <p:spPr>
+          <a:xfrm>
+            <a:off x="290307" y="86661"/>
+            <a:ext cx="4045649" cy="3236977"/>
+          </a:xfrm>
+          <a:prstGeom prst="rect">
+            <a:avLst/>
+          </a:prstGeom>
+        </p:spPr>
+      </p:pic>
+      <p:pic>
+        <p:nvPicPr>
+          <p:cNvPr id="5" name="Picture 4"/>
+          <p:cNvPicPr>
+            <a:picLocks noChangeAspect="1"/>
+          </p:cNvPicPr>
+          <p:nvPr/>
+        </p:nvPicPr>
+        <p:blipFill>
+          <a:blip r:embed="rId3" cstate="print">
+            <a:extLst>
+              <a:ext uri="{28A0092B-C50C-407E-A947-70E740481C1C}">
+                <a14:useLocalDpi xmlns:a14="http://schemas.microsoft.com/office/drawing/2010/main" val="0"/>
+              </a:ext>
+            </a:extLst>
+          </a:blip>
+          <a:stretch>
+            <a:fillRect/>
+          </a:stretch>
+        </p:blipFill>
+        <p:spPr>
+          <a:xfrm>
+            <a:off x="4517137" y="145890"/>
+            <a:ext cx="4045650" cy="3236977"/>
+          </a:xfrm>
+          <a:prstGeom prst="rect">
+            <a:avLst/>
+          </a:prstGeom>
+        </p:spPr>
+      </p:pic>
+      <p:pic>
+        <p:nvPicPr>
+          <p:cNvPr id="6" name="Picture 5"/>
+          <p:cNvPicPr>
+            <a:picLocks noChangeAspect="1"/>
+          </p:cNvPicPr>
+          <p:nvPr/>
+        </p:nvPicPr>
+        <p:blipFill>
+          <a:blip r:embed="rId4" cstate="print">
+            <a:extLst>
+              <a:ext uri="{28A0092B-C50C-407E-A947-70E740481C1C}">
+                <a14:useLocalDpi xmlns:a14="http://schemas.microsoft.com/office/drawing/2010/main" val="0"/>
+              </a:ext>
+            </a:extLst>
+          </a:blip>
+          <a:stretch>
+            <a:fillRect/>
+          </a:stretch>
+        </p:blipFill>
+        <p:spPr>
+          <a:xfrm>
+            <a:off x="372603" y="3483267"/>
+            <a:ext cx="3963353" cy="3171130"/>
+          </a:xfrm>
+          <a:prstGeom prst="rect">
+            <a:avLst/>
+          </a:prstGeom>
+        </p:spPr>
+      </p:pic>
+      <p:pic>
+        <p:nvPicPr>
+          <p:cNvPr id="7" name="Picture 6"/>
+          <p:cNvPicPr>
+            <a:picLocks noChangeAspect="1"/>
+          </p:cNvPicPr>
+          <p:nvPr/>
+        </p:nvPicPr>
+        <p:blipFill>
+          <a:blip r:embed="rId5" cstate="print">
+            <a:extLst>
+              <a:ext uri="{28A0092B-C50C-407E-A947-70E740481C1C}">
+                <a14:useLocalDpi xmlns:a14="http://schemas.microsoft.com/office/drawing/2010/main" val="0"/>
+              </a:ext>
+            </a:extLst>
+          </a:blip>
+          <a:stretch>
+            <a:fillRect/>
+          </a:stretch>
+        </p:blipFill>
+        <p:spPr>
+          <a:xfrm>
+            <a:off x="4517137" y="3535683"/>
+            <a:ext cx="4045650" cy="3236977"/>
+          </a:xfrm>
+          <a:prstGeom prst="rect">
+            <a:avLst/>
+          </a:prstGeom>
+        </p:spPr>
+      </p:pic>
+    </p:spTree>
+    <p:extLst>
+      <p:ext uri="{BB962C8B-B14F-4D97-AF65-F5344CB8AC3E}">
+        <p14:creationId xmlns:p14="http://schemas.microsoft.com/office/powerpoint/2010/main" val="1176498846"/>
+      </p:ext>
+    </p:extLst>
+  </p:cSld>
+  <p:clrMapOvr>
+    <a:masterClrMapping/>
+  </p:clrMapOvr>
+  <p:timing>
+    <p:tnLst>
+      <p:par>
+        <p:cTn id="1" dur="indefinite" restart="never" nodeType="tmRoot"/>
+      </p:par>
+    </p:tnLst>
+  </p:timing>
+</p:sld>
+</file>
+
+<file path=ppt/slides/slide19.xml><?xml version="1.0" encoding="utf-8"?>
+<p:sld xmlns:a="http://schemas.openxmlformats.org/drawingml/2006/main" xmlns:r="http://schemas.openxmlformats.org/officeDocument/2006/relationships" xmlns:p="http://schemas.openxmlformats.org/presentationml/2006/main">
+  <p:cSld>
+    <p:spTree>
+      <p:nvGrpSpPr>
+        <p:cNvPr id="1" name=""/>
+        <p:cNvGrpSpPr/>
+        <p:nvPr/>
+      </p:nvGrpSpPr>
+      <p:grpSpPr>
+        <a:xfrm>
+          <a:off x="0" y="0"/>
+          <a:ext cx="0" cy="0"/>
+          <a:chOff x="0" y="0"/>
+          <a:chExt cx="0" cy="0"/>
+        </a:xfrm>
+      </p:grpSpPr>
+      <p:pic>
+        <p:nvPicPr>
+          <p:cNvPr id="4" name="Content Placeholder 3"/>
+          <p:cNvPicPr>
+            <a:picLocks noGrp="1" noChangeAspect="1"/>
+          </p:cNvPicPr>
+          <p:nvPr>
+            <p:ph idx="1"/>
+          </p:nvPr>
+        </p:nvPicPr>
+        <p:blipFill>
+          <a:blip r:embed="rId2" cstate="print">
+            <a:extLst>
+              <a:ext uri="{28A0092B-C50C-407E-A947-70E740481C1C}">
+                <a14:useLocalDpi xmlns:a14="http://schemas.microsoft.com/office/drawing/2010/main" val="0"/>
+              </a:ext>
+            </a:extLst>
+          </a:blip>
+          <a:stretch>
+            <a:fillRect/>
+          </a:stretch>
+        </p:blipFill>
+        <p:spPr>
+          <a:xfrm>
+            <a:off x="420624" y="183737"/>
+            <a:ext cx="4135252" cy="3308669"/>
+          </a:xfrm>
+        </p:spPr>
+      </p:pic>
+      <p:pic>
+        <p:nvPicPr>
+          <p:cNvPr id="5" name="Picture 4"/>
+          <p:cNvPicPr>
+            <a:picLocks noChangeAspect="1"/>
+          </p:cNvPicPr>
+          <p:nvPr/>
+        </p:nvPicPr>
+        <p:blipFill>
+          <a:blip r:embed="rId3" cstate="print">
+            <a:extLst>
+              <a:ext uri="{28A0092B-C50C-407E-A947-70E740481C1C}">
+                <a14:useLocalDpi xmlns:a14="http://schemas.microsoft.com/office/drawing/2010/main" val="0"/>
+              </a:ext>
+            </a:extLst>
+          </a:blip>
+          <a:stretch>
+            <a:fillRect/>
+          </a:stretch>
+        </p:blipFill>
+        <p:spPr>
+          <a:xfrm>
+            <a:off x="4914872" y="152523"/>
+            <a:ext cx="4174264" cy="3339883"/>
+          </a:xfrm>
+          <a:prstGeom prst="rect">
+            <a:avLst/>
+          </a:prstGeom>
+        </p:spPr>
+      </p:pic>
+      <p:pic>
+        <p:nvPicPr>
+          <p:cNvPr id="6" name="Picture 5"/>
+          <p:cNvPicPr>
+            <a:picLocks noChangeAspect="1"/>
+          </p:cNvPicPr>
+          <p:nvPr/>
+        </p:nvPicPr>
+        <p:blipFill>
+          <a:blip r:embed="rId4" cstate="print">
+            <a:extLst>
+              <a:ext uri="{28A0092B-C50C-407E-A947-70E740481C1C}">
+                <a14:useLocalDpi xmlns:a14="http://schemas.microsoft.com/office/drawing/2010/main" val="0"/>
+              </a:ext>
+            </a:extLst>
+          </a:blip>
+          <a:stretch>
+            <a:fillRect/>
+          </a:stretch>
+        </p:blipFill>
+        <p:spPr>
+          <a:xfrm>
+            <a:off x="4914872" y="3518117"/>
+            <a:ext cx="4174264" cy="3339883"/>
+          </a:xfrm>
+          <a:prstGeom prst="rect">
+            <a:avLst/>
+          </a:prstGeom>
+        </p:spPr>
+      </p:pic>
+      <p:pic>
+        <p:nvPicPr>
+          <p:cNvPr id="7" name="Picture 6"/>
+          <p:cNvPicPr>
+            <a:picLocks noChangeAspect="1"/>
+          </p:cNvPicPr>
+          <p:nvPr/>
+        </p:nvPicPr>
+        <p:blipFill>
+          <a:blip r:embed="rId5" cstate="print">
+            <a:extLst>
+              <a:ext uri="{28A0092B-C50C-407E-A947-70E740481C1C}">
+                <a14:useLocalDpi xmlns:a14="http://schemas.microsoft.com/office/drawing/2010/main" val="0"/>
+              </a:ext>
+            </a:extLst>
+          </a:blip>
+          <a:stretch>
+            <a:fillRect/>
+          </a:stretch>
+        </p:blipFill>
+        <p:spPr>
+          <a:xfrm>
+            <a:off x="418801" y="3547872"/>
+            <a:ext cx="4137075" cy="3310128"/>
+          </a:xfrm>
+          <a:prstGeom prst="rect">
+            <a:avLst/>
+          </a:prstGeom>
+        </p:spPr>
+      </p:pic>
+    </p:spTree>
+    <p:extLst>
+      <p:ext uri="{BB962C8B-B14F-4D97-AF65-F5344CB8AC3E}">
+        <p14:creationId xmlns:p14="http://schemas.microsoft.com/office/powerpoint/2010/main" val="3204030559"/>
+      </p:ext>
+    </p:extLst>
+  </p:cSld>
+  <p:clrMapOvr>
+    <a:masterClrMapping/>
+  </p:clrMapOvr>
+  <p:timing>
+    <p:tnLst>
+      <p:par>
+        <p:cTn id="1" dur="indefinite" restart="never" nodeType="tmRoot"/>
+      </p:par>
+    </p:tnLst>
+  </p:timing>
 </p:sld>
 </file>
 
@@ -3152,6 +4684,1170 @@
     <p:extLst>
       <p:ext uri="{BB962C8B-B14F-4D97-AF65-F5344CB8AC3E}">
         <p14:creationId xmlns:p14="http://schemas.microsoft.com/office/powerpoint/2010/main" val="3651109022"/>
+      </p:ext>
+    </p:extLst>
+  </p:cSld>
+  <p:clrMapOvr>
+    <a:masterClrMapping/>
+  </p:clrMapOvr>
+  <p:timing>
+    <p:tnLst>
+      <p:par>
+        <p:cTn id="1" dur="indefinite" restart="never" nodeType="tmRoot"/>
+      </p:par>
+    </p:tnLst>
+  </p:timing>
+</p:sld>
+</file>
+
+<file path=ppt/slides/slide20.xml><?xml version="1.0" encoding="utf-8"?>
+<p:sld xmlns:a="http://schemas.openxmlformats.org/drawingml/2006/main" xmlns:r="http://schemas.openxmlformats.org/officeDocument/2006/relationships" xmlns:p="http://schemas.openxmlformats.org/presentationml/2006/main">
+  <p:cSld>
+    <p:spTree>
+      <p:nvGrpSpPr>
+        <p:cNvPr id="1" name=""/>
+        <p:cNvGrpSpPr/>
+        <p:nvPr/>
+      </p:nvGrpSpPr>
+      <p:grpSpPr>
+        <a:xfrm>
+          <a:off x="0" y="0"/>
+          <a:ext cx="0" cy="0"/>
+          <a:chOff x="0" y="0"/>
+          <a:chExt cx="0" cy="0"/>
+        </a:xfrm>
+      </p:grpSpPr>
+      <p:sp>
+        <p:nvSpPr>
+          <p:cNvPr id="2" name="Title 1"/>
+          <p:cNvSpPr>
+            <a:spLocks noGrp="1"/>
+          </p:cNvSpPr>
+          <p:nvPr>
+            <p:ph type="title"/>
+          </p:nvPr>
+        </p:nvSpPr>
+        <p:spPr/>
+        <p:txBody>
+          <a:bodyPr/>
+          <a:lstStyle/>
+          <a:p>
+            <a:endParaRPr lang="en-GB"/>
+          </a:p>
+        </p:txBody>
+      </p:sp>
+      <p:pic>
+        <p:nvPicPr>
+          <p:cNvPr id="4" name="Content Placeholder 3"/>
+          <p:cNvPicPr>
+            <a:picLocks noGrp="1" noChangeAspect="1"/>
+          </p:cNvPicPr>
+          <p:nvPr>
+            <p:ph idx="1"/>
+          </p:nvPr>
+        </p:nvPicPr>
+        <p:blipFill>
+          <a:blip r:embed="rId2" cstate="print">
+            <a:extLst>
+              <a:ext uri="{28A0092B-C50C-407E-A947-70E740481C1C}">
+                <a14:useLocalDpi xmlns:a14="http://schemas.microsoft.com/office/drawing/2010/main" val="0"/>
+              </a:ext>
+            </a:extLst>
+          </a:blip>
+          <a:stretch>
+            <a:fillRect/>
+          </a:stretch>
+        </p:blipFill>
+        <p:spPr>
+          <a:xfrm>
+            <a:off x="713232" y="70016"/>
+            <a:ext cx="10182693" cy="6787984"/>
+          </a:xfrm>
+        </p:spPr>
+      </p:pic>
+    </p:spTree>
+    <p:extLst>
+      <p:ext uri="{BB962C8B-B14F-4D97-AF65-F5344CB8AC3E}">
+        <p14:creationId xmlns:p14="http://schemas.microsoft.com/office/powerpoint/2010/main" val="743836908"/>
+      </p:ext>
+    </p:extLst>
+  </p:cSld>
+  <p:clrMapOvr>
+    <a:masterClrMapping/>
+  </p:clrMapOvr>
+  <p:timing>
+    <p:tnLst>
+      <p:par>
+        <p:cTn id="1" dur="indefinite" restart="never" nodeType="tmRoot"/>
+      </p:par>
+    </p:tnLst>
+  </p:timing>
+</p:sld>
+</file>
+
+<file path=ppt/slides/slide21.xml><?xml version="1.0" encoding="utf-8"?>
+<p:sld xmlns:a="http://schemas.openxmlformats.org/drawingml/2006/main" xmlns:r="http://schemas.openxmlformats.org/officeDocument/2006/relationships" xmlns:p="http://schemas.openxmlformats.org/presentationml/2006/main">
+  <p:cSld>
+    <p:spTree>
+      <p:nvGrpSpPr>
+        <p:cNvPr id="1" name=""/>
+        <p:cNvGrpSpPr/>
+        <p:nvPr/>
+      </p:nvGrpSpPr>
+      <p:grpSpPr>
+        <a:xfrm>
+          <a:off x="0" y="0"/>
+          <a:ext cx="0" cy="0"/>
+          <a:chOff x="0" y="0"/>
+          <a:chExt cx="0" cy="0"/>
+        </a:xfrm>
+      </p:grpSpPr>
+      <p:sp>
+        <p:nvSpPr>
+          <p:cNvPr id="2" name="Title 1"/>
+          <p:cNvSpPr>
+            <a:spLocks noGrp="1"/>
+          </p:cNvSpPr>
+          <p:nvPr>
+            <p:ph type="title"/>
+          </p:nvPr>
+        </p:nvSpPr>
+        <p:spPr/>
+        <p:txBody>
+          <a:bodyPr/>
+          <a:lstStyle/>
+          <a:p>
+            <a:r>
+              <a:rPr lang="en-GB" dirty="0" smtClean="0"/>
+              <a:t>Discussion: Methodological Contributions</a:t>
+            </a:r>
+            <a:endParaRPr lang="en-GB" dirty="0"/>
+          </a:p>
+        </p:txBody>
+      </p:sp>
+      <p:sp>
+        <p:nvSpPr>
+          <p:cNvPr id="3" name="Content Placeholder 2"/>
+          <p:cNvSpPr>
+            <a:spLocks noGrp="1"/>
+          </p:cNvSpPr>
+          <p:nvPr>
+            <p:ph idx="1"/>
+          </p:nvPr>
+        </p:nvSpPr>
+        <p:spPr/>
+        <p:txBody>
+          <a:bodyPr>
+            <a:normAutofit/>
+          </a:bodyPr>
+          <a:lstStyle/>
+          <a:p>
+            <a:r>
+              <a:rPr lang="en-GB" dirty="0"/>
+              <a:t>Much data can be shown and made sense of at a time </a:t>
+            </a:r>
+          </a:p>
+          <a:p>
+            <a:pPr lvl="1"/>
+            <a:r>
+              <a:rPr lang="en-GB" i="1" dirty="0"/>
+              <a:t>Nearly 100 000 values represented in the </a:t>
+            </a:r>
+            <a:r>
+              <a:rPr lang="en-GB" i="1" dirty="0" err="1"/>
+              <a:t>latticeplot</a:t>
+            </a:r>
+            <a:endParaRPr lang="en-GB" i="1" dirty="0"/>
+          </a:p>
+          <a:p>
+            <a:r>
+              <a:rPr lang="en-GB" dirty="0"/>
+              <a:t>Complex data vis: A need to slow… down</a:t>
+            </a:r>
+          </a:p>
+          <a:p>
+            <a:pPr lvl="1"/>
+            <a:r>
+              <a:rPr lang="en-GB" dirty="0"/>
+              <a:t>Guiding through steps</a:t>
+            </a:r>
+          </a:p>
+          <a:p>
+            <a:r>
+              <a:rPr lang="en-GB" dirty="0"/>
+              <a:t>Intuitive sense of where different countries are heading</a:t>
+            </a:r>
+          </a:p>
+          <a:p>
+            <a:r>
+              <a:rPr lang="en-GB" dirty="0"/>
+              <a:t>Plotting of contours gives an approximate sense of trajectories:</a:t>
+            </a:r>
+          </a:p>
+          <a:p>
+            <a:pPr lvl="1"/>
+            <a:r>
+              <a:rPr lang="en-GB" i="1" dirty="0"/>
+              <a:t>Extrapolate </a:t>
+            </a:r>
+            <a:r>
+              <a:rPr lang="en-GB" i="1" dirty="0" err="1"/>
+              <a:t>iff</a:t>
+            </a:r>
+            <a:r>
+              <a:rPr lang="en-GB" i="1" dirty="0"/>
+              <a:t> age &lt; 42? Vertical if age &gt;= 42?</a:t>
+            </a:r>
+          </a:p>
+          <a:p>
+            <a:r>
+              <a:rPr lang="en-GB" dirty="0"/>
+              <a:t>Ordering in </a:t>
+            </a:r>
+            <a:r>
+              <a:rPr lang="en-GB" dirty="0" err="1"/>
+              <a:t>latticeplot</a:t>
+            </a:r>
+            <a:r>
+              <a:rPr lang="en-GB" dirty="0"/>
+              <a:t> is for last year but implied </a:t>
+            </a:r>
+            <a:r>
+              <a:rPr lang="en-GB" dirty="0" err="1"/>
+              <a:t>trendlines</a:t>
+            </a:r>
+            <a:r>
+              <a:rPr lang="en-GB" dirty="0"/>
+              <a:t> suggest which are stabilising and which are changing</a:t>
+            </a:r>
+          </a:p>
+          <a:p>
+            <a:endParaRPr lang="en-GB" dirty="0"/>
+          </a:p>
+        </p:txBody>
+      </p:sp>
+    </p:spTree>
+    <p:extLst>
+      <p:ext uri="{BB962C8B-B14F-4D97-AF65-F5344CB8AC3E}">
+        <p14:creationId xmlns:p14="http://schemas.microsoft.com/office/powerpoint/2010/main" val="2075594930"/>
+      </p:ext>
+    </p:extLst>
+  </p:cSld>
+  <p:clrMapOvr>
+    <a:masterClrMapping/>
+  </p:clrMapOvr>
+  <p:timing>
+    <p:tnLst>
+      <p:par>
+        <p:cTn id="1" dur="indefinite" restart="never" nodeType="tmRoot"/>
+      </p:par>
+    </p:tnLst>
+  </p:timing>
+</p:sld>
+</file>
+
+<file path=ppt/slides/slide22.xml><?xml version="1.0" encoding="utf-8"?>
+<p:sld xmlns:a="http://schemas.openxmlformats.org/drawingml/2006/main" xmlns:r="http://schemas.openxmlformats.org/officeDocument/2006/relationships" xmlns:p="http://schemas.openxmlformats.org/presentationml/2006/main">
+  <p:cSld>
+    <p:spTree>
+      <p:nvGrpSpPr>
+        <p:cNvPr id="1" name=""/>
+        <p:cNvGrpSpPr/>
+        <p:nvPr/>
+      </p:nvGrpSpPr>
+      <p:grpSpPr>
+        <a:xfrm>
+          <a:off x="0" y="0"/>
+          <a:ext cx="0" cy="0"/>
+          <a:chOff x="0" y="0"/>
+          <a:chExt cx="0" cy="0"/>
+        </a:xfrm>
+      </p:grpSpPr>
+      <p:sp>
+        <p:nvSpPr>
+          <p:cNvPr id="2" name="Title 1"/>
+          <p:cNvSpPr>
+            <a:spLocks noGrp="1"/>
+          </p:cNvSpPr>
+          <p:nvPr>
+            <p:ph type="title"/>
+          </p:nvPr>
+        </p:nvSpPr>
+        <p:spPr/>
+        <p:txBody>
+          <a:bodyPr/>
+          <a:lstStyle/>
+          <a:p>
+            <a:r>
+              <a:rPr lang="en-GB" dirty="0" smtClean="0"/>
+              <a:t>Discussion: Substantive Contributions</a:t>
+            </a:r>
+            <a:endParaRPr lang="en-GB" dirty="0"/>
+          </a:p>
+        </p:txBody>
+      </p:sp>
+      <p:sp>
+        <p:nvSpPr>
+          <p:cNvPr id="3" name="Content Placeholder 2"/>
+          <p:cNvSpPr>
+            <a:spLocks noGrp="1"/>
+          </p:cNvSpPr>
+          <p:nvPr>
+            <p:ph idx="1"/>
+          </p:nvPr>
+        </p:nvSpPr>
+        <p:spPr/>
+        <p:txBody>
+          <a:bodyPr/>
+          <a:lstStyle/>
+          <a:p>
+            <a:r>
+              <a:rPr lang="en-GB" dirty="0"/>
+              <a:t>Most (‘developed’) countries do not achieve replacement fertility levels</a:t>
+            </a:r>
+          </a:p>
+          <a:p>
+            <a:r>
+              <a:rPr lang="en-GB" dirty="0"/>
+              <a:t>Countries that have include: Albania, Iceland, Ireland, New Zealand, USA, Norway?</a:t>
+            </a:r>
+          </a:p>
+          <a:p>
+            <a:r>
+              <a:rPr lang="en-GB" dirty="0"/>
+              <a:t>No strong overall relationship between countries’ CCFRs and regions</a:t>
+            </a:r>
+          </a:p>
+          <a:p>
+            <a:pPr lvl="1"/>
+            <a:r>
+              <a:rPr lang="en-GB" i="1" dirty="0"/>
+              <a:t>Southern and Central European countries tend have low fertility</a:t>
+            </a:r>
+          </a:p>
+          <a:p>
+            <a:pPr lvl="1"/>
+            <a:r>
+              <a:rPr lang="en-GB" i="1" dirty="0"/>
+              <a:t>Small countries with relatively high fertility</a:t>
+            </a:r>
+          </a:p>
+          <a:p>
+            <a:r>
+              <a:rPr lang="en-GB" dirty="0"/>
+              <a:t>Ordering in </a:t>
+            </a:r>
+            <a:r>
+              <a:rPr lang="en-GB" dirty="0" err="1"/>
+              <a:t>latticeplot</a:t>
+            </a:r>
+            <a:r>
+              <a:rPr lang="en-GB" dirty="0"/>
+              <a:t> is by fertility in last year, but lines show </a:t>
+            </a:r>
+            <a:r>
+              <a:rPr lang="en-GB" dirty="0" smtClean="0"/>
+              <a:t>different trajectories</a:t>
+            </a:r>
+            <a:endParaRPr lang="en-GB" dirty="0"/>
+          </a:p>
+          <a:p>
+            <a:endParaRPr lang="en-GB" dirty="0"/>
+          </a:p>
+        </p:txBody>
+      </p:sp>
+    </p:spTree>
+    <p:extLst>
+      <p:ext uri="{BB962C8B-B14F-4D97-AF65-F5344CB8AC3E}">
+        <p14:creationId xmlns:p14="http://schemas.microsoft.com/office/powerpoint/2010/main" val="1988594390"/>
+      </p:ext>
+    </p:extLst>
+  </p:cSld>
+  <p:clrMapOvr>
+    <a:masterClrMapping/>
+  </p:clrMapOvr>
+  <p:timing>
+    <p:tnLst>
+      <p:par>
+        <p:cTn id="1" dur="indefinite" restart="never" nodeType="tmRoot"/>
+      </p:par>
+    </p:tnLst>
+  </p:timing>
+</p:sld>
+</file>
+
+<file path=ppt/slides/slide23.xml><?xml version="1.0" encoding="utf-8"?>
+<p:sld xmlns:a="http://schemas.openxmlformats.org/drawingml/2006/main" xmlns:r="http://schemas.openxmlformats.org/officeDocument/2006/relationships" xmlns:p="http://schemas.openxmlformats.org/presentationml/2006/main">
+  <p:cSld>
+    <p:spTree>
+      <p:nvGrpSpPr>
+        <p:cNvPr id="1" name=""/>
+        <p:cNvGrpSpPr/>
+        <p:nvPr/>
+      </p:nvGrpSpPr>
+      <p:grpSpPr>
+        <a:xfrm>
+          <a:off x="0" y="0"/>
+          <a:ext cx="0" cy="0"/>
+          <a:chOff x="0" y="0"/>
+          <a:chExt cx="0" cy="0"/>
+        </a:xfrm>
+      </p:grpSpPr>
+      <p:sp>
+        <p:nvSpPr>
+          <p:cNvPr id="2" name="Title 1"/>
+          <p:cNvSpPr>
+            <a:spLocks noGrp="1"/>
+          </p:cNvSpPr>
+          <p:nvPr>
+            <p:ph type="title"/>
+          </p:nvPr>
+        </p:nvSpPr>
+        <p:spPr/>
+        <p:txBody>
+          <a:bodyPr/>
+          <a:lstStyle/>
+          <a:p>
+            <a:r>
+              <a:rPr lang="en-GB" dirty="0" smtClean="0"/>
+              <a:t>Discussions: Speculations</a:t>
+            </a:r>
+            <a:endParaRPr lang="en-GB" dirty="0"/>
+          </a:p>
+        </p:txBody>
+      </p:sp>
+      <p:sp>
+        <p:nvSpPr>
+          <p:cNvPr id="3" name="Content Placeholder 2"/>
+          <p:cNvSpPr>
+            <a:spLocks noGrp="1"/>
+          </p:cNvSpPr>
+          <p:nvPr>
+            <p:ph idx="1"/>
+          </p:nvPr>
+        </p:nvSpPr>
+        <p:spPr/>
+        <p:txBody>
+          <a:bodyPr/>
+          <a:lstStyle/>
+          <a:p>
+            <a:r>
+              <a:rPr lang="en-GB" dirty="0"/>
+              <a:t>Primary and secondary effects of migration</a:t>
+            </a:r>
+          </a:p>
+          <a:p>
+            <a:pPr lvl="1"/>
+            <a:r>
+              <a:rPr lang="en-GB" i="1" dirty="0"/>
+              <a:t>USA fertility recovery and Mexican immigration?</a:t>
+            </a:r>
+          </a:p>
+          <a:p>
+            <a:r>
+              <a:rPr lang="en-GB" dirty="0"/>
+              <a:t>Germany, Austria and openness to migration</a:t>
+            </a:r>
+          </a:p>
+          <a:p>
+            <a:r>
+              <a:rPr lang="en-GB" dirty="0"/>
+              <a:t>Differences between Scotland and England/Wales (‘</a:t>
+            </a:r>
+            <a:r>
+              <a:rPr lang="en-GB" dirty="0" err="1"/>
+              <a:t>Wangland</a:t>
+            </a:r>
+            <a:r>
+              <a:rPr lang="en-GB" dirty="0"/>
+              <a:t>’)</a:t>
+            </a:r>
+          </a:p>
+          <a:p>
+            <a:r>
+              <a:rPr lang="en-GB" dirty="0"/>
+              <a:t>Regional differences within countries</a:t>
+            </a:r>
+          </a:p>
+          <a:p>
+            <a:pPr lvl="1"/>
+            <a:r>
+              <a:rPr lang="en-GB" i="1" dirty="0"/>
+              <a:t>London and the rest</a:t>
+            </a:r>
+          </a:p>
+          <a:p>
+            <a:endParaRPr lang="en-GB" dirty="0"/>
+          </a:p>
+        </p:txBody>
+      </p:sp>
+    </p:spTree>
+    <p:extLst>
+      <p:ext uri="{BB962C8B-B14F-4D97-AF65-F5344CB8AC3E}">
+        <p14:creationId xmlns:p14="http://schemas.microsoft.com/office/powerpoint/2010/main" val="3358993497"/>
+      </p:ext>
+    </p:extLst>
+  </p:cSld>
+  <p:clrMapOvr>
+    <a:masterClrMapping/>
+  </p:clrMapOvr>
+  <p:timing>
+    <p:tnLst>
+      <p:par>
+        <p:cTn id="1" dur="indefinite" restart="never" nodeType="tmRoot"/>
+      </p:par>
+    </p:tnLst>
+  </p:timing>
+</p:sld>
+</file>
+
+<file path=ppt/slides/slide24.xml><?xml version="1.0" encoding="utf-8"?>
+<p:sld xmlns:a="http://schemas.openxmlformats.org/drawingml/2006/main" xmlns:r="http://schemas.openxmlformats.org/officeDocument/2006/relationships" xmlns:p="http://schemas.openxmlformats.org/presentationml/2006/main">
+  <p:cSld>
+    <p:spTree>
+      <p:nvGrpSpPr>
+        <p:cNvPr id="1" name=""/>
+        <p:cNvGrpSpPr/>
+        <p:nvPr/>
+      </p:nvGrpSpPr>
+      <p:grpSpPr>
+        <a:xfrm>
+          <a:off x="0" y="0"/>
+          <a:ext cx="0" cy="0"/>
+          <a:chOff x="0" y="0"/>
+          <a:chExt cx="0" cy="0"/>
+        </a:xfrm>
+      </p:grpSpPr>
+      <p:pic>
+        <p:nvPicPr>
+          <p:cNvPr id="4" name="Content Placeholder 3"/>
+          <p:cNvPicPr>
+            <a:picLocks noGrp="1" noChangeAspect="1"/>
+          </p:cNvPicPr>
+          <p:nvPr>
+            <p:ph idx="1"/>
+          </p:nvPr>
+        </p:nvPicPr>
+        <p:blipFill rotWithShape="1">
+          <a:blip r:embed="rId2" cstate="print">
+            <a:extLst>
+              <a:ext uri="{28A0092B-C50C-407E-A947-70E740481C1C}">
+                <a14:useLocalDpi xmlns:a14="http://schemas.microsoft.com/office/drawing/2010/main" val="0"/>
+              </a:ext>
+            </a:extLst>
+          </a:blip>
+          <a:srcRect l="88996" t="2096" r="1620" b="87030"/>
+          <a:stretch/>
+        </p:blipFill>
+        <p:spPr>
+          <a:xfrm>
+            <a:off x="6440953" y="383413"/>
+            <a:ext cx="2761626" cy="3199974"/>
+          </a:xfrm>
+        </p:spPr>
+      </p:pic>
+      <p:pic>
+        <p:nvPicPr>
+          <p:cNvPr id="5" name="Picture 4"/>
+          <p:cNvPicPr>
+            <a:picLocks noChangeAspect="1"/>
+          </p:cNvPicPr>
+          <p:nvPr/>
+        </p:nvPicPr>
+        <p:blipFill rotWithShape="1">
+          <a:blip r:embed="rId2" cstate="print">
+            <a:extLst>
+              <a:ext uri="{28A0092B-C50C-407E-A947-70E740481C1C}">
+                <a14:useLocalDpi xmlns:a14="http://schemas.microsoft.com/office/drawing/2010/main" val="0"/>
+              </a:ext>
+            </a:extLst>
+          </a:blip>
+          <a:srcRect l="2045" t="50676" r="86888" b="41191"/>
+          <a:stretch/>
+        </p:blipFill>
+        <p:spPr>
+          <a:xfrm>
+            <a:off x="2166203" y="3739896"/>
+            <a:ext cx="3583099" cy="2633362"/>
+          </a:xfrm>
+          <a:prstGeom prst="rect">
+            <a:avLst/>
+          </a:prstGeom>
+        </p:spPr>
+      </p:pic>
+      <p:pic>
+        <p:nvPicPr>
+          <p:cNvPr id="6" name="Picture 5"/>
+          <p:cNvPicPr>
+            <a:picLocks noChangeAspect="1"/>
+          </p:cNvPicPr>
+          <p:nvPr/>
+        </p:nvPicPr>
+        <p:blipFill rotWithShape="1">
+          <a:blip r:embed="rId2" cstate="print">
+            <a:extLst>
+              <a:ext uri="{28A0092B-C50C-407E-A947-70E740481C1C}">
+                <a14:useLocalDpi xmlns:a14="http://schemas.microsoft.com/office/drawing/2010/main" val="0"/>
+              </a:ext>
+            </a:extLst>
+          </a:blip>
+          <a:srcRect l="89111" t="2534" b="87066"/>
+          <a:stretch/>
+        </p:blipFill>
+        <p:spPr>
+          <a:xfrm>
+            <a:off x="3449114" y="689578"/>
+            <a:ext cx="746760" cy="713232"/>
+          </a:xfrm>
+          <a:prstGeom prst="rect">
+            <a:avLst/>
+          </a:prstGeom>
+        </p:spPr>
+      </p:pic>
+      <p:pic>
+        <p:nvPicPr>
+          <p:cNvPr id="7" name="Picture 6"/>
+          <p:cNvPicPr>
+            <a:picLocks noChangeAspect="1"/>
+          </p:cNvPicPr>
+          <p:nvPr/>
+        </p:nvPicPr>
+        <p:blipFill rotWithShape="1">
+          <a:blip r:embed="rId2" cstate="print">
+            <a:extLst>
+              <a:ext uri="{28A0092B-C50C-407E-A947-70E740481C1C}">
+                <a14:useLocalDpi xmlns:a14="http://schemas.microsoft.com/office/drawing/2010/main" val="0"/>
+              </a:ext>
+            </a:extLst>
+          </a:blip>
+          <a:srcRect l="1778" t="2134" r="86355" b="86933"/>
+          <a:stretch/>
+        </p:blipFill>
+        <p:spPr>
+          <a:xfrm>
+            <a:off x="2345631" y="447421"/>
+            <a:ext cx="3403671" cy="3135966"/>
+          </a:xfrm>
+          <a:prstGeom prst="rect">
+            <a:avLst/>
+          </a:prstGeom>
+        </p:spPr>
+      </p:pic>
+      <p:pic>
+        <p:nvPicPr>
+          <p:cNvPr id="8" name="Picture 7"/>
+          <p:cNvPicPr>
+            <a:picLocks noChangeAspect="1"/>
+          </p:cNvPicPr>
+          <p:nvPr/>
+        </p:nvPicPr>
+        <p:blipFill rotWithShape="1">
+          <a:blip r:embed="rId2" cstate="print">
+            <a:extLst>
+              <a:ext uri="{28A0092B-C50C-407E-A947-70E740481C1C}">
+                <a14:useLocalDpi xmlns:a14="http://schemas.microsoft.com/office/drawing/2010/main" val="0"/>
+              </a:ext>
+            </a:extLst>
+          </a:blip>
+          <a:srcRect l="88977" t="51067" r="1157" b="40799"/>
+          <a:stretch/>
+        </p:blipFill>
+        <p:spPr>
+          <a:xfrm>
+            <a:off x="6284745" y="3959352"/>
+            <a:ext cx="3074041" cy="2534007"/>
+          </a:xfrm>
+          <a:prstGeom prst="rect">
+            <a:avLst/>
+          </a:prstGeom>
+        </p:spPr>
+      </p:pic>
+    </p:spTree>
+    <p:extLst>
+      <p:ext uri="{BB962C8B-B14F-4D97-AF65-F5344CB8AC3E}">
+        <p14:creationId xmlns:p14="http://schemas.microsoft.com/office/powerpoint/2010/main" val="1574832673"/>
+      </p:ext>
+    </p:extLst>
+  </p:cSld>
+  <p:clrMapOvr>
+    <a:masterClrMapping/>
+  </p:clrMapOvr>
+  <p:timing>
+    <p:tnLst>
+      <p:par>
+        <p:cTn id="1" dur="indefinite" restart="never" nodeType="tmRoot"/>
+      </p:par>
+    </p:tnLst>
+  </p:timing>
+</p:sld>
+</file>
+
+<file path=ppt/slides/slide25.xml><?xml version="1.0" encoding="utf-8"?>
+<p:sld xmlns:a="http://schemas.openxmlformats.org/drawingml/2006/main" xmlns:r="http://schemas.openxmlformats.org/officeDocument/2006/relationships" xmlns:p="http://schemas.openxmlformats.org/presentationml/2006/main">
+  <p:cSld>
+    <p:spTree>
+      <p:nvGrpSpPr>
+        <p:cNvPr id="1" name=""/>
+        <p:cNvGrpSpPr/>
+        <p:nvPr/>
+      </p:nvGrpSpPr>
+      <p:grpSpPr>
+        <a:xfrm>
+          <a:off x="0" y="0"/>
+          <a:ext cx="0" cy="0"/>
+          <a:chOff x="0" y="0"/>
+          <a:chExt cx="0" cy="0"/>
+        </a:xfrm>
+      </p:grpSpPr>
+      <p:sp>
+        <p:nvSpPr>
+          <p:cNvPr id="2" name="Title 1"/>
+          <p:cNvSpPr>
+            <a:spLocks noGrp="1"/>
+          </p:cNvSpPr>
+          <p:nvPr>
+            <p:ph type="title"/>
+          </p:nvPr>
+        </p:nvSpPr>
+        <p:spPr/>
+        <p:txBody>
+          <a:bodyPr/>
+          <a:lstStyle/>
+          <a:p>
+            <a:r>
+              <a:rPr lang="en-GB" dirty="0" smtClean="0"/>
+              <a:t>Discussion: Refugee Crises and European Demographic Trajectories</a:t>
+            </a:r>
+            <a:endParaRPr lang="en-GB" dirty="0"/>
+          </a:p>
+        </p:txBody>
+      </p:sp>
+      <p:sp>
+        <p:nvSpPr>
+          <p:cNvPr id="3" name="Content Placeholder 2"/>
+          <p:cNvSpPr>
+            <a:spLocks noGrp="1"/>
+          </p:cNvSpPr>
+          <p:nvPr>
+            <p:ph idx="1"/>
+          </p:nvPr>
+        </p:nvSpPr>
+        <p:spPr/>
+        <p:txBody>
+          <a:bodyPr>
+            <a:normAutofit/>
+          </a:bodyPr>
+          <a:lstStyle/>
+          <a:p>
+            <a:r>
+              <a:rPr lang="en-GB" dirty="0"/>
+              <a:t>Almost all European countries need migration to stabilise dependency </a:t>
+            </a:r>
+            <a:r>
+              <a:rPr lang="en-GB" dirty="0" smtClean="0"/>
+              <a:t>ratios</a:t>
+            </a:r>
+          </a:p>
+          <a:p>
+            <a:pPr lvl="1"/>
+            <a:r>
+              <a:rPr lang="en-GB" dirty="0" smtClean="0"/>
+              <a:t>Primary effects: More 25 year olds now</a:t>
+            </a:r>
+          </a:p>
+          <a:p>
+            <a:pPr lvl="1"/>
+            <a:r>
+              <a:rPr lang="en-GB" dirty="0" smtClean="0"/>
+              <a:t>Secondary effects (perhaps): higher fertility rates so more 25 year olds in the next generation </a:t>
+            </a:r>
+            <a:endParaRPr lang="en-GB" dirty="0"/>
+          </a:p>
+          <a:p>
+            <a:r>
+              <a:rPr lang="en-GB" dirty="0"/>
+              <a:t>Within EU, countries with lower fertility appear more accepting of </a:t>
+            </a:r>
+            <a:r>
+              <a:rPr lang="en-GB" dirty="0" smtClean="0"/>
+              <a:t>refugees</a:t>
+            </a:r>
+          </a:p>
+          <a:p>
+            <a:pPr lvl="1"/>
+            <a:r>
+              <a:rPr lang="en-GB" dirty="0" smtClean="0"/>
+              <a:t>Austria, Germany, Italy?</a:t>
+            </a:r>
+          </a:p>
+          <a:p>
+            <a:endParaRPr lang="en-GB" dirty="0"/>
+          </a:p>
+        </p:txBody>
+      </p:sp>
+    </p:spTree>
+    <p:extLst>
+      <p:ext uri="{BB962C8B-B14F-4D97-AF65-F5344CB8AC3E}">
+        <p14:creationId xmlns:p14="http://schemas.microsoft.com/office/powerpoint/2010/main" val="2133357168"/>
+      </p:ext>
+    </p:extLst>
+  </p:cSld>
+  <p:clrMapOvr>
+    <a:masterClrMapping/>
+  </p:clrMapOvr>
+  <p:timing>
+    <p:tnLst>
+      <p:par>
+        <p:cTn id="1" dur="indefinite" restart="never" nodeType="tmRoot"/>
+      </p:par>
+    </p:tnLst>
+  </p:timing>
+</p:sld>
+</file>
+
+<file path=ppt/slides/slide26.xml><?xml version="1.0" encoding="utf-8"?>
+<p:sld xmlns:a="http://schemas.openxmlformats.org/drawingml/2006/main" xmlns:r="http://schemas.openxmlformats.org/officeDocument/2006/relationships" xmlns:p="http://schemas.openxmlformats.org/presentationml/2006/main">
+  <p:cSld>
+    <p:spTree>
+      <p:nvGrpSpPr>
+        <p:cNvPr id="1" name=""/>
+        <p:cNvGrpSpPr/>
+        <p:nvPr/>
+      </p:nvGrpSpPr>
+      <p:grpSpPr>
+        <a:xfrm>
+          <a:off x="0" y="0"/>
+          <a:ext cx="0" cy="0"/>
+          <a:chOff x="0" y="0"/>
+          <a:chExt cx="0" cy="0"/>
+        </a:xfrm>
+      </p:grpSpPr>
+      <p:sp>
+        <p:nvSpPr>
+          <p:cNvPr id="2" name="Title 1"/>
+          <p:cNvSpPr>
+            <a:spLocks noGrp="1"/>
+          </p:cNvSpPr>
+          <p:nvPr>
+            <p:ph type="title"/>
+          </p:nvPr>
+        </p:nvSpPr>
+        <p:spPr/>
+        <p:txBody>
+          <a:bodyPr/>
+          <a:lstStyle/>
+          <a:p>
+            <a:r>
+              <a:rPr lang="en-GB" dirty="0" smtClean="0"/>
+              <a:t>Discussion: Brexit</a:t>
+            </a:r>
+            <a:endParaRPr lang="en-GB" dirty="0"/>
+          </a:p>
+        </p:txBody>
+      </p:sp>
+      <p:sp>
+        <p:nvSpPr>
+          <p:cNvPr id="3" name="Content Placeholder 2"/>
+          <p:cNvSpPr>
+            <a:spLocks noGrp="1"/>
+          </p:cNvSpPr>
+          <p:nvPr>
+            <p:ph idx="1"/>
+          </p:nvPr>
+        </p:nvSpPr>
+        <p:spPr/>
+        <p:txBody>
+          <a:bodyPr/>
+          <a:lstStyle/>
+          <a:p>
+            <a:r>
+              <a:rPr lang="en-GB" dirty="0"/>
+              <a:t>Brexit: Mass migration is the solution to long-term decline in Europe, not the problem</a:t>
+            </a:r>
+          </a:p>
+          <a:p>
+            <a:r>
+              <a:rPr lang="en-GB" dirty="0"/>
+              <a:t>As long as </a:t>
+            </a:r>
+            <a:endParaRPr lang="en-GB" dirty="0" smtClean="0"/>
+          </a:p>
+          <a:p>
+            <a:pPr lvl="1"/>
+            <a:r>
+              <a:rPr lang="en-GB" dirty="0" smtClean="0"/>
+              <a:t>short-term costs</a:t>
+            </a:r>
+          </a:p>
+          <a:p>
+            <a:pPr lvl="1"/>
+            <a:r>
+              <a:rPr lang="en-GB" dirty="0" smtClean="0"/>
+              <a:t>regional variations in service demand</a:t>
+            </a:r>
+          </a:p>
+          <a:p>
+            <a:r>
+              <a:rPr lang="en-GB" dirty="0" smtClean="0"/>
+              <a:t>- can be mitigated appropriately</a:t>
+            </a:r>
+            <a:endParaRPr lang="en-GB" dirty="0"/>
+          </a:p>
+          <a:p>
+            <a:r>
+              <a:rPr lang="en-GB" dirty="0" smtClean="0"/>
+              <a:t>Conservatives: Austerity</a:t>
+            </a:r>
+          </a:p>
+          <a:p>
+            <a:r>
+              <a:rPr lang="en-GB" dirty="0" smtClean="0"/>
+              <a:t>Labour (or a bit of it): Migration Relief Fund</a:t>
+            </a:r>
+          </a:p>
+          <a:p>
+            <a:r>
+              <a:rPr lang="en-GB" dirty="0" smtClean="0"/>
+              <a:t>Scarcity: “Charity begins at home”</a:t>
+            </a:r>
+            <a:endParaRPr lang="en-GB" dirty="0"/>
+          </a:p>
+        </p:txBody>
+      </p:sp>
+    </p:spTree>
+    <p:extLst>
+      <p:ext uri="{BB962C8B-B14F-4D97-AF65-F5344CB8AC3E}">
+        <p14:creationId xmlns:p14="http://schemas.microsoft.com/office/powerpoint/2010/main" val="2249497134"/>
+      </p:ext>
+    </p:extLst>
+  </p:cSld>
+  <p:clrMapOvr>
+    <a:masterClrMapping/>
+  </p:clrMapOvr>
+  <p:timing>
+    <p:tnLst>
+      <p:par>
+        <p:cTn id="1" dur="indefinite" restart="never" nodeType="tmRoot"/>
+      </p:par>
+    </p:tnLst>
+  </p:timing>
+</p:sld>
+</file>
+
+<file path=ppt/slides/slide27.xml><?xml version="1.0" encoding="utf-8"?>
+<p:sld xmlns:a="http://schemas.openxmlformats.org/drawingml/2006/main" xmlns:r="http://schemas.openxmlformats.org/officeDocument/2006/relationships" xmlns:p="http://schemas.openxmlformats.org/presentationml/2006/main">
+  <p:cSld>
+    <p:spTree>
+      <p:nvGrpSpPr>
+        <p:cNvPr id="1" name=""/>
+        <p:cNvGrpSpPr/>
+        <p:nvPr/>
+      </p:nvGrpSpPr>
+      <p:grpSpPr>
+        <a:xfrm>
+          <a:off x="0" y="0"/>
+          <a:ext cx="0" cy="0"/>
+          <a:chOff x="0" y="0"/>
+          <a:chExt cx="0" cy="0"/>
+        </a:xfrm>
+      </p:grpSpPr>
+      <p:sp>
+        <p:nvSpPr>
+          <p:cNvPr id="2" name="Title 1"/>
+          <p:cNvSpPr>
+            <a:spLocks noGrp="1"/>
+          </p:cNvSpPr>
+          <p:nvPr>
+            <p:ph type="title"/>
+          </p:nvPr>
+        </p:nvSpPr>
+        <p:spPr/>
+        <p:txBody>
+          <a:bodyPr/>
+          <a:lstStyle/>
+          <a:p>
+            <a:r>
+              <a:rPr lang="en-GB" dirty="0" smtClean="0"/>
+              <a:t>For further information</a:t>
+            </a:r>
+            <a:endParaRPr lang="en-GB" dirty="0"/>
+          </a:p>
+        </p:txBody>
+      </p:sp>
+      <p:sp>
+        <p:nvSpPr>
+          <p:cNvPr id="3" name="Content Placeholder 2"/>
+          <p:cNvSpPr>
+            <a:spLocks noGrp="1"/>
+          </p:cNvSpPr>
+          <p:nvPr>
+            <p:ph idx="1"/>
+          </p:nvPr>
+        </p:nvSpPr>
+        <p:spPr/>
+        <p:txBody>
+          <a:bodyPr>
+            <a:normAutofit fontScale="77500" lnSpcReduction="20000"/>
+          </a:bodyPr>
+          <a:lstStyle/>
+          <a:p>
+            <a:r>
+              <a:rPr lang="en-GB" dirty="0" smtClean="0"/>
+              <a:t>NCRM podcast:</a:t>
+            </a:r>
+          </a:p>
+          <a:p>
+            <a:pPr lvl="1"/>
+            <a:r>
+              <a:rPr lang="en-GB" dirty="0">
+                <a:hlinkClick r:id="rId2"/>
+              </a:rPr>
+              <a:t>http://</a:t>
+            </a:r>
+            <a:r>
+              <a:rPr lang="en-GB" dirty="0" smtClean="0">
+                <a:hlinkClick r:id="rId2"/>
+              </a:rPr>
+              <a:t>www.ncrm.ac.uk/resources/podcasts/view.php/Visualising-social-trends-in-3D</a:t>
+            </a:r>
+            <a:endParaRPr lang="en-GB" dirty="0" smtClean="0"/>
+          </a:p>
+          <a:p>
+            <a:r>
+              <a:rPr lang="en-GB" dirty="0" smtClean="0"/>
+              <a:t>Blogs:</a:t>
+            </a:r>
+          </a:p>
+          <a:p>
+            <a:pPr lvl="1"/>
+            <a:r>
+              <a:rPr lang="en-GB" dirty="0">
+                <a:hlinkClick r:id="rId3"/>
+              </a:rPr>
+              <a:t>https://ije-blog.com/2016/06/27/lexis-cubes-1-from-maps-of-space-to-maps-of-time</a:t>
+            </a:r>
+            <a:r>
+              <a:rPr lang="en-GB" dirty="0" smtClean="0">
+                <a:hlinkClick r:id="rId3"/>
+              </a:rPr>
+              <a:t>/</a:t>
+            </a:r>
+            <a:endParaRPr lang="en-GB" dirty="0" smtClean="0"/>
+          </a:p>
+          <a:p>
+            <a:pPr lvl="1"/>
+            <a:r>
+              <a:rPr lang="en-GB" dirty="0">
+                <a:hlinkClick r:id="rId4"/>
+              </a:rPr>
+              <a:t>https://ije-blog.com/2016/06/27/lexis-cubes-2-case-study-log-mortality-for-males-in-finland-1878-to-2012</a:t>
+            </a:r>
+            <a:r>
+              <a:rPr lang="en-GB" dirty="0" smtClean="0">
+                <a:hlinkClick r:id="rId4"/>
+              </a:rPr>
+              <a:t>/</a:t>
+            </a:r>
+            <a:endParaRPr lang="en-GB" dirty="0" smtClean="0"/>
+          </a:p>
+          <a:p>
+            <a:r>
+              <a:rPr lang="en-GB" dirty="0" smtClean="0"/>
+              <a:t>Papers:</a:t>
+            </a:r>
+          </a:p>
+          <a:p>
+            <a:pPr lvl="1"/>
+            <a:r>
+              <a:rPr lang="en-GB" dirty="0">
+                <a:hlinkClick r:id="rId5"/>
+              </a:rPr>
+              <a:t>http://</a:t>
+            </a:r>
+            <a:r>
+              <a:rPr lang="en-GB" dirty="0" smtClean="0">
+                <a:hlinkClick r:id="rId5"/>
+              </a:rPr>
+              <a:t>www.ncbi.nlm.nih.gov/pubmed/24062300</a:t>
+            </a:r>
+            <a:endParaRPr lang="en-GB" dirty="0" smtClean="0"/>
+          </a:p>
+          <a:p>
+            <a:pPr lvl="1"/>
+            <a:r>
+              <a:rPr lang="en-GB" dirty="0">
+                <a:hlinkClick r:id="rId6"/>
+              </a:rPr>
+              <a:t>http://</a:t>
+            </a:r>
+            <a:r>
+              <a:rPr lang="en-GB" dirty="0" smtClean="0">
+                <a:hlinkClick r:id="rId6"/>
+              </a:rPr>
+              <a:t>jech.bmj.com/content/early/2016/03/01/jech-2014-205226.abstract</a:t>
+            </a:r>
+            <a:endParaRPr lang="en-GB" dirty="0" smtClean="0"/>
+          </a:p>
+          <a:p>
+            <a:pPr lvl="1"/>
+            <a:r>
+              <a:rPr lang="en-GB" dirty="0">
+                <a:hlinkClick r:id="rId7"/>
+              </a:rPr>
+              <a:t>http://</a:t>
+            </a:r>
+            <a:r>
+              <a:rPr lang="en-GB" dirty="0" smtClean="0">
+                <a:hlinkClick r:id="rId7"/>
+              </a:rPr>
+              <a:t>www.sciencedirect.com/science/article/pii/S1877584514000173</a:t>
+            </a:r>
+            <a:endParaRPr lang="en-GB" dirty="0"/>
+          </a:p>
+          <a:p>
+            <a:r>
+              <a:rPr lang="en-GB" dirty="0" err="1" smtClean="0"/>
+              <a:t>Github</a:t>
+            </a:r>
+            <a:r>
+              <a:rPr lang="en-GB" dirty="0" smtClean="0"/>
+              <a:t> repos (as before)</a:t>
+            </a:r>
+          </a:p>
+          <a:p>
+            <a:r>
+              <a:rPr lang="en-GB" dirty="0" smtClean="0"/>
+              <a:t>Or… email </a:t>
+            </a:r>
+            <a:r>
+              <a:rPr lang="en-GB" dirty="0" smtClean="0">
+                <a:hlinkClick r:id="rId8"/>
+              </a:rPr>
+              <a:t>Jonathan.Minton@Glasgow.ac.uk</a:t>
+            </a:r>
+            <a:r>
+              <a:rPr lang="en-GB" dirty="0" smtClean="0"/>
+              <a:t> </a:t>
+            </a:r>
+          </a:p>
+          <a:p>
+            <a:endParaRPr lang="en-GB" dirty="0"/>
+          </a:p>
+          <a:p>
+            <a:r>
+              <a:rPr lang="en-GB" dirty="0" smtClean="0"/>
+              <a:t>Thanks for listening!</a:t>
+            </a:r>
+          </a:p>
+          <a:p>
+            <a:endParaRPr lang="en-GB" dirty="0"/>
+          </a:p>
+        </p:txBody>
+      </p:sp>
+    </p:spTree>
+    <p:extLst>
+      <p:ext uri="{BB962C8B-B14F-4D97-AF65-F5344CB8AC3E}">
+        <p14:creationId xmlns:p14="http://schemas.microsoft.com/office/powerpoint/2010/main" val="3761528294"/>
       </p:ext>
     </p:extLst>
   </p:cSld>
@@ -3195,7 +5891,7 @@
           <a:p>
             <a:r>
               <a:rPr lang="en-GB" dirty="0" smtClean="0"/>
-              <a:t>Key aim</a:t>
+              <a:t>Introduction: Fertility in Europe</a:t>
             </a:r>
             <a:endParaRPr lang="en-GB" dirty="0"/>
           </a:p>
@@ -3218,7 +5914,19 @@
           <a:p>
             <a:r>
               <a:rPr lang="en-GB" dirty="0" smtClean="0"/>
-              <a:t>To show how Lexis surface visualisations to make sense of hundreds of thousands of data points and understand fertility trends in 40 countries. </a:t>
+              <a:t>Fertility has been declining</a:t>
+            </a:r>
+          </a:p>
+          <a:p>
+            <a:r>
+              <a:rPr lang="en-GB" dirty="0" smtClean="0"/>
+              <a:t>There are differences between European regions</a:t>
+            </a:r>
+          </a:p>
+          <a:p>
+            <a:r>
+              <a:rPr lang="en-GB" dirty="0" smtClean="0"/>
+              <a:t>… And between Europe and other parts of the world</a:t>
             </a:r>
             <a:endParaRPr lang="en-GB" dirty="0"/>
           </a:p>
@@ -3227,13 +5935,20 @@
     </p:spTree>
     <p:extLst>
       <p:ext uri="{BB962C8B-B14F-4D97-AF65-F5344CB8AC3E}">
-        <p14:creationId xmlns:p14="http://schemas.microsoft.com/office/powerpoint/2010/main" val="705753594"/>
+        <p14:creationId xmlns:p14="http://schemas.microsoft.com/office/powerpoint/2010/main" val="3846641655"/>
       </p:ext>
     </p:extLst>
   </p:cSld>
   <p:clrMapOvr>
     <a:masterClrMapping/>
   </p:clrMapOvr>
+  <p:timing>
+    <p:tnLst>
+      <p:par>
+        <p:cTn id="1" dur="indefinite" restart="never" nodeType="tmRoot"/>
+      </p:par>
+    </p:tnLst>
+  </p:timing>
 </p:sld>
 </file>
 
@@ -3271,7 +5986,7 @@
           <a:p>
             <a:r>
               <a:rPr lang="en-GB" dirty="0" smtClean="0"/>
-              <a:t>Structure</a:t>
+              <a:t>Introduction: Lexis Surfaces</a:t>
             </a:r>
             <a:endParaRPr lang="en-GB" dirty="0"/>
           </a:p>
@@ -3294,26 +6009,57 @@
           <a:p>
             <a:r>
               <a:rPr lang="en-GB" dirty="0" smtClean="0"/>
-              <a:t>Introduction</a:t>
-            </a:r>
-          </a:p>
-          <a:p>
-            <a:r>
-              <a:rPr lang="en-GB" dirty="0" smtClean="0"/>
-              <a:t>Methods </a:t>
-            </a:r>
-          </a:p>
-          <a:p>
-            <a:r>
-              <a:rPr lang="en-GB" dirty="0" smtClean="0"/>
-              <a:t>Results </a:t>
-            </a:r>
-          </a:p>
-          <a:p>
-            <a:r>
-              <a:rPr lang="en-GB" dirty="0" smtClean="0"/>
-              <a:t>Discussion</a:t>
-            </a:r>
+              <a:t>Share the challenge and techniques of map-makers</a:t>
+            </a:r>
+          </a:p>
+          <a:p>
+            <a:pPr lvl="1"/>
+            <a:r>
+              <a:rPr lang="en-GB" dirty="0" smtClean="0"/>
+              <a:t>How to visually represent three dimensional relationships on a two dimensional surface</a:t>
+            </a:r>
+          </a:p>
+          <a:p>
+            <a:r>
+              <a:rPr lang="en-GB" dirty="0" smtClean="0"/>
+              <a:t>Treating time like space</a:t>
+            </a:r>
+          </a:p>
+          <a:p>
+            <a:pPr lvl="1"/>
+            <a:r>
+              <a:rPr lang="en-GB" dirty="0" smtClean="0"/>
+              <a:t>Spatial maps have latitude and longitude</a:t>
+            </a:r>
+          </a:p>
+          <a:p>
+            <a:pPr lvl="1"/>
+            <a:r>
+              <a:rPr lang="en-GB" dirty="0" smtClean="0"/>
+              <a:t>Temporal maps (Lexis surfaces) have absolute time and relative time</a:t>
+            </a:r>
+          </a:p>
+          <a:p>
+            <a:pPr lvl="2"/>
+            <a:r>
+              <a:rPr lang="en-GB" dirty="0" smtClean="0"/>
+              <a:t>Absolute time: year</a:t>
+            </a:r>
+          </a:p>
+          <a:p>
+            <a:pPr lvl="2"/>
+            <a:r>
+              <a:rPr lang="en-GB" dirty="0" smtClean="0"/>
+              <a:t>Relative time: time since birth, time since first child, time since leaving education, </a:t>
+            </a:r>
+            <a:r>
+              <a:rPr lang="en-GB" dirty="0" err="1" smtClean="0"/>
+              <a:t>etc</a:t>
+            </a:r>
+            <a:endParaRPr lang="en-GB" dirty="0" smtClean="0"/>
+          </a:p>
+          <a:p>
+            <a:pPr lvl="2"/>
             <a:endParaRPr lang="en-GB" dirty="0"/>
           </a:p>
         </p:txBody>
@@ -3321,13 +6067,502 @@
     </p:spTree>
     <p:extLst>
       <p:ext uri="{BB962C8B-B14F-4D97-AF65-F5344CB8AC3E}">
-        <p14:creationId xmlns:p14="http://schemas.microsoft.com/office/powerpoint/2010/main" val="1675382188"/>
+        <p14:creationId xmlns:p14="http://schemas.microsoft.com/office/powerpoint/2010/main" val="294447516"/>
       </p:ext>
     </p:extLst>
   </p:cSld>
   <p:clrMapOvr>
     <a:masterClrMapping/>
   </p:clrMapOvr>
+  <p:timing>
+    <p:tnLst>
+      <p:par>
+        <p:cTn id="1" dur="indefinite" restart="never" nodeType="tmRoot"/>
+      </p:par>
+    </p:tnLst>
+  </p:timing>
+</p:sld>
+</file>
+
+<file path=ppt/slides/slide5.xml><?xml version="1.0" encoding="utf-8"?>
+<p:sld xmlns:a="http://schemas.openxmlformats.org/drawingml/2006/main" xmlns:r="http://schemas.openxmlformats.org/officeDocument/2006/relationships" xmlns:p="http://schemas.openxmlformats.org/presentationml/2006/main">
+  <p:cSld>
+    <p:spTree>
+      <p:nvGrpSpPr>
+        <p:cNvPr id="1" name=""/>
+        <p:cNvGrpSpPr/>
+        <p:nvPr/>
+      </p:nvGrpSpPr>
+      <p:grpSpPr>
+        <a:xfrm>
+          <a:off x="0" y="0"/>
+          <a:ext cx="0" cy="0"/>
+          <a:chOff x="0" y="0"/>
+          <a:chExt cx="0" cy="0"/>
+        </a:xfrm>
+      </p:grpSpPr>
+      <p:pic>
+        <p:nvPicPr>
+          <p:cNvPr id="1028" name="Picture 4" descr="Figures 1A&amp;amp;B"/>
+          <p:cNvPicPr>
+            <a:picLocks noChangeAspect="1" noChangeArrowheads="1"/>
+          </p:cNvPicPr>
+          <p:nvPr/>
+        </p:nvPicPr>
+        <p:blipFill>
+          <a:blip r:embed="rId2">
+            <a:extLst>
+              <a:ext uri="{28A0092B-C50C-407E-A947-70E740481C1C}">
+                <a14:useLocalDpi xmlns:a14="http://schemas.microsoft.com/office/drawing/2010/main" val="0"/>
+              </a:ext>
+            </a:extLst>
+          </a:blip>
+          <a:srcRect/>
+          <a:stretch>
+            <a:fillRect/>
+          </a:stretch>
+        </p:blipFill>
+        <p:spPr bwMode="auto">
+          <a:xfrm>
+            <a:off x="868807" y="393191"/>
+            <a:ext cx="9756521" cy="5652677"/>
+          </a:xfrm>
+          <a:prstGeom prst="rect">
+            <a:avLst/>
+          </a:prstGeom>
+          <a:noFill/>
+          <a:extLst>
+            <a:ext uri="{909E8E84-426E-40DD-AFC4-6F175D3DCCD1}">
+              <a14:hiddenFill xmlns:a14="http://schemas.microsoft.com/office/drawing/2010/main">
+                <a:solidFill>
+                  <a:srgbClr val="FFFFFF"/>
+                </a:solidFill>
+              </a14:hiddenFill>
+            </a:ext>
+          </a:extLst>
+        </p:spPr>
+      </p:pic>
+      <p:sp>
+        <p:nvSpPr>
+          <p:cNvPr id="5" name="Rectangle 4"/>
+          <p:cNvSpPr/>
+          <p:nvPr/>
+        </p:nvSpPr>
+        <p:spPr>
+          <a:xfrm>
+            <a:off x="195072" y="6045868"/>
+            <a:ext cx="11554968" cy="369332"/>
+          </a:xfrm>
+          <a:prstGeom prst="rect">
+            <a:avLst/>
+          </a:prstGeom>
+        </p:spPr>
+        <p:txBody>
+          <a:bodyPr wrap="square">
+            <a:spAutoFit/>
+          </a:bodyPr>
+          <a:lstStyle/>
+          <a:p>
+            <a:r>
+              <a:rPr lang="en-GB" dirty="0"/>
+              <a:t>https://ije-blog.com/2016/06/27/lexis-cubes-1-from-maps-of-space-to-maps-of-time/</a:t>
+            </a:r>
+          </a:p>
+        </p:txBody>
+      </p:sp>
+    </p:spTree>
+    <p:extLst>
+      <p:ext uri="{BB962C8B-B14F-4D97-AF65-F5344CB8AC3E}">
+        <p14:creationId xmlns:p14="http://schemas.microsoft.com/office/powerpoint/2010/main" val="4285675962"/>
+      </p:ext>
+    </p:extLst>
+  </p:cSld>
+  <p:clrMapOvr>
+    <a:masterClrMapping/>
+  </p:clrMapOvr>
+  <p:timing>
+    <p:tnLst>
+      <p:par>
+        <p:cTn id="1" dur="indefinite" restart="never" nodeType="tmRoot"/>
+      </p:par>
+    </p:tnLst>
+  </p:timing>
+</p:sld>
+</file>
+
+<file path=ppt/slides/slide6.xml><?xml version="1.0" encoding="utf-8"?>
+<p:sld xmlns:a="http://schemas.openxmlformats.org/drawingml/2006/main" xmlns:r="http://schemas.openxmlformats.org/officeDocument/2006/relationships" xmlns:p="http://schemas.openxmlformats.org/presentationml/2006/main">
+  <p:cSld>
+    <p:spTree>
+      <p:nvGrpSpPr>
+        <p:cNvPr id="1" name=""/>
+        <p:cNvGrpSpPr/>
+        <p:nvPr/>
+      </p:nvGrpSpPr>
+      <p:grpSpPr>
+        <a:xfrm>
+          <a:off x="0" y="0"/>
+          <a:ext cx="0" cy="0"/>
+          <a:chOff x="0" y="0"/>
+          <a:chExt cx="0" cy="0"/>
+        </a:xfrm>
+      </p:grpSpPr>
+      <p:sp>
+        <p:nvSpPr>
+          <p:cNvPr id="2" name="Title 1"/>
+          <p:cNvSpPr>
+            <a:spLocks noGrp="1"/>
+          </p:cNvSpPr>
+          <p:nvPr>
+            <p:ph type="title"/>
+          </p:nvPr>
+        </p:nvSpPr>
+        <p:spPr/>
+        <p:txBody>
+          <a:bodyPr/>
+          <a:lstStyle/>
+          <a:p>
+            <a:r>
+              <a:rPr lang="en-GB" dirty="0" smtClean="0"/>
+              <a:t>Demographic definitions of fertility</a:t>
+            </a:r>
+            <a:endParaRPr lang="en-GB" dirty="0"/>
+          </a:p>
+        </p:txBody>
+      </p:sp>
+      <p:sp>
+        <p:nvSpPr>
+          <p:cNvPr id="3" name="Content Placeholder 2"/>
+          <p:cNvSpPr>
+            <a:spLocks noGrp="1"/>
+          </p:cNvSpPr>
+          <p:nvPr>
+            <p:ph idx="1"/>
+          </p:nvPr>
+        </p:nvSpPr>
+        <p:spPr/>
+        <p:txBody>
+          <a:bodyPr/>
+          <a:lstStyle/>
+          <a:p>
+            <a:r>
+              <a:rPr lang="en-GB" dirty="0" smtClean="0"/>
+              <a:t>Not about biological potential, but about ‘realisation of outcome’</a:t>
+            </a:r>
+          </a:p>
+          <a:p>
+            <a:r>
+              <a:rPr lang="en-GB" dirty="0" smtClean="0"/>
+              <a:t>Age-specific fertility rates</a:t>
+            </a:r>
+          </a:p>
+          <a:p>
+            <a:pPr lvl="1"/>
+            <a:r>
+              <a:rPr lang="en-GB" dirty="0" smtClean="0"/>
+              <a:t>Number of live births/woman of age x in period (year/birth year) y</a:t>
+            </a:r>
+          </a:p>
+          <a:p>
+            <a:pPr lvl="1"/>
+            <a:r>
+              <a:rPr lang="en-GB" dirty="0" smtClean="0"/>
+              <a:t>(Various technical complications about defining age and period: squares, triangles or parallelograms)</a:t>
+            </a:r>
+          </a:p>
+          <a:p>
+            <a:r>
+              <a:rPr lang="en-GB" dirty="0" smtClean="0"/>
+              <a:t>Schedule of fertility rate with age</a:t>
+            </a:r>
+          </a:p>
+          <a:p>
+            <a:r>
+              <a:rPr lang="en-GB" dirty="0" smtClean="0"/>
+              <a:t>Total fertility rates as a period-based measure</a:t>
+            </a:r>
+            <a:endParaRPr lang="en-GB" dirty="0"/>
+          </a:p>
+        </p:txBody>
+      </p:sp>
+    </p:spTree>
+    <p:extLst>
+      <p:ext uri="{BB962C8B-B14F-4D97-AF65-F5344CB8AC3E}">
+        <p14:creationId xmlns:p14="http://schemas.microsoft.com/office/powerpoint/2010/main" val="265272338"/>
+      </p:ext>
+    </p:extLst>
+  </p:cSld>
+  <p:clrMapOvr>
+    <a:masterClrMapping/>
+  </p:clrMapOvr>
+  <p:timing>
+    <p:tnLst>
+      <p:par>
+        <p:cTn id="1" dur="indefinite" restart="never" nodeType="tmRoot"/>
+      </p:par>
+    </p:tnLst>
+  </p:timing>
+</p:sld>
+</file>
+
+<file path=ppt/slides/slide7.xml><?xml version="1.0" encoding="utf-8"?>
+<p:sld xmlns:a="http://schemas.openxmlformats.org/drawingml/2006/main" xmlns:r="http://schemas.openxmlformats.org/officeDocument/2006/relationships" xmlns:p="http://schemas.openxmlformats.org/presentationml/2006/main">
+  <p:cSld>
+    <p:spTree>
+      <p:nvGrpSpPr>
+        <p:cNvPr id="1" name=""/>
+        <p:cNvGrpSpPr/>
+        <p:nvPr/>
+      </p:nvGrpSpPr>
+      <p:grpSpPr>
+        <a:xfrm>
+          <a:off x="0" y="0"/>
+          <a:ext cx="0" cy="0"/>
+          <a:chOff x="0" y="0"/>
+          <a:chExt cx="0" cy="0"/>
+        </a:xfrm>
+      </p:grpSpPr>
+      <p:pic>
+        <p:nvPicPr>
+          <p:cNvPr id="4" name="Content Placeholder 3"/>
+          <p:cNvPicPr>
+            <a:picLocks noGrp="1" noChangeAspect="1"/>
+          </p:cNvPicPr>
+          <p:nvPr>
+            <p:ph idx="1"/>
+          </p:nvPr>
+        </p:nvPicPr>
+        <p:blipFill>
+          <a:blip r:embed="rId2" cstate="print">
+            <a:extLst>
+              <a:ext uri="{28A0092B-C50C-407E-A947-70E740481C1C}">
+                <a14:useLocalDpi xmlns:a14="http://schemas.microsoft.com/office/drawing/2010/main" val="0"/>
+              </a:ext>
+            </a:extLst>
+          </a:blip>
+          <a:stretch>
+            <a:fillRect/>
+          </a:stretch>
+        </p:blipFill>
+        <p:spPr>
+          <a:xfrm>
+            <a:off x="1730836" y="448056"/>
+            <a:ext cx="9159668" cy="6106446"/>
+          </a:xfrm>
+        </p:spPr>
+      </p:pic>
+    </p:spTree>
+    <p:extLst>
+      <p:ext uri="{BB962C8B-B14F-4D97-AF65-F5344CB8AC3E}">
+        <p14:creationId xmlns:p14="http://schemas.microsoft.com/office/powerpoint/2010/main" val="1078459743"/>
+      </p:ext>
+    </p:extLst>
+  </p:cSld>
+  <p:clrMapOvr>
+    <a:masterClrMapping/>
+  </p:clrMapOvr>
+  <p:timing>
+    <p:tnLst>
+      <p:par>
+        <p:cTn id="1" dur="indefinite" restart="never" nodeType="tmRoot"/>
+      </p:par>
+    </p:tnLst>
+  </p:timing>
+</p:sld>
+</file>
+
+<file path=ppt/slides/slide8.xml><?xml version="1.0" encoding="utf-8"?>
+<p:sld xmlns:a="http://schemas.openxmlformats.org/drawingml/2006/main" xmlns:r="http://schemas.openxmlformats.org/officeDocument/2006/relationships" xmlns:p="http://schemas.openxmlformats.org/presentationml/2006/main">
+  <p:cSld>
+    <p:spTree>
+      <p:nvGrpSpPr>
+        <p:cNvPr id="1" name=""/>
+        <p:cNvGrpSpPr/>
+        <p:nvPr/>
+      </p:nvGrpSpPr>
+      <p:grpSpPr>
+        <a:xfrm>
+          <a:off x="0" y="0"/>
+          <a:ext cx="0" cy="0"/>
+          <a:chOff x="0" y="0"/>
+          <a:chExt cx="0" cy="0"/>
+        </a:xfrm>
+      </p:grpSpPr>
+      <p:sp>
+        <p:nvSpPr>
+          <p:cNvPr id="2" name="Title 1"/>
+          <p:cNvSpPr>
+            <a:spLocks noGrp="1"/>
+          </p:cNvSpPr>
+          <p:nvPr>
+            <p:ph type="title"/>
+          </p:nvPr>
+        </p:nvSpPr>
+        <p:spPr/>
+        <p:txBody>
+          <a:bodyPr/>
+          <a:lstStyle/>
+          <a:p>
+            <a:r>
+              <a:rPr lang="en-GB" dirty="0" smtClean="0"/>
+              <a:t>Period measures and cohort measures</a:t>
+            </a:r>
+            <a:endParaRPr lang="en-GB" dirty="0"/>
+          </a:p>
+        </p:txBody>
+      </p:sp>
+      <p:sp>
+        <p:nvSpPr>
+          <p:cNvPr id="3" name="Content Placeholder 2"/>
+          <p:cNvSpPr>
+            <a:spLocks noGrp="1"/>
+          </p:cNvSpPr>
+          <p:nvPr>
+            <p:ph idx="1"/>
+          </p:nvPr>
+        </p:nvSpPr>
+        <p:spPr/>
+        <p:txBody>
+          <a:bodyPr/>
+          <a:lstStyle/>
+          <a:p>
+            <a:r>
+              <a:rPr lang="en-GB" dirty="0" smtClean="0"/>
+              <a:t>Total fertility rates as a period-based measure:</a:t>
+            </a:r>
+          </a:p>
+          <a:p>
+            <a:pPr lvl="1"/>
+            <a:r>
+              <a:rPr lang="en-GB" dirty="0" smtClean="0"/>
+              <a:t>Observations of schedule of age and fertility rate observed in a period</a:t>
+            </a:r>
+          </a:p>
+          <a:p>
+            <a:pPr lvl="1"/>
+            <a:r>
+              <a:rPr lang="en-GB" dirty="0" smtClean="0"/>
+              <a:t>Effectively produces a ‘synthetic cohort’</a:t>
+            </a:r>
+          </a:p>
+          <a:p>
+            <a:pPr lvl="1"/>
+            <a:r>
+              <a:rPr lang="en-GB" dirty="0" smtClean="0"/>
+              <a:t>(</a:t>
+            </a:r>
+            <a:r>
+              <a:rPr lang="en-GB" dirty="0" err="1" smtClean="0"/>
+              <a:t>n.b.</a:t>
+            </a:r>
+            <a:r>
+              <a:rPr lang="en-GB" dirty="0" smtClean="0"/>
+              <a:t> biological and demographic uses of the term ‘period’ are distinct)</a:t>
+            </a:r>
+          </a:p>
+          <a:p>
+            <a:pPr lvl="1"/>
+            <a:endParaRPr lang="en-GB" dirty="0"/>
+          </a:p>
+          <a:p>
+            <a:pPr marL="0" indent="0">
+              <a:buNone/>
+            </a:pPr>
+            <a:endParaRPr lang="en-GB" dirty="0" smtClean="0"/>
+          </a:p>
+          <a:p>
+            <a:pPr lvl="1"/>
+            <a:endParaRPr lang="en-GB" dirty="0"/>
+          </a:p>
+          <a:p>
+            <a:pPr lvl="1"/>
+            <a:endParaRPr lang="en-GB" dirty="0" smtClean="0"/>
+          </a:p>
+        </p:txBody>
+      </p:sp>
+    </p:spTree>
+    <p:extLst>
+      <p:ext uri="{BB962C8B-B14F-4D97-AF65-F5344CB8AC3E}">
+        <p14:creationId xmlns:p14="http://schemas.microsoft.com/office/powerpoint/2010/main" val="2988208253"/>
+      </p:ext>
+    </p:extLst>
+  </p:cSld>
+  <p:clrMapOvr>
+    <a:masterClrMapping/>
+  </p:clrMapOvr>
+  <p:timing>
+    <p:tnLst>
+      <p:par>
+        <p:cTn id="1" dur="indefinite" restart="never" nodeType="tmRoot"/>
+      </p:par>
+    </p:tnLst>
+  </p:timing>
+</p:sld>
+</file>
+
+<file path=ppt/slides/slide9.xml><?xml version="1.0" encoding="utf-8"?>
+<p:sld xmlns:a="http://schemas.openxmlformats.org/drawingml/2006/main" xmlns:r="http://schemas.openxmlformats.org/officeDocument/2006/relationships" xmlns:p="http://schemas.openxmlformats.org/presentationml/2006/main">
+  <p:cSld>
+    <p:spTree>
+      <p:nvGrpSpPr>
+        <p:cNvPr id="1" name=""/>
+        <p:cNvGrpSpPr/>
+        <p:nvPr/>
+      </p:nvGrpSpPr>
+      <p:grpSpPr>
+        <a:xfrm>
+          <a:off x="0" y="0"/>
+          <a:ext cx="0" cy="0"/>
+          <a:chOff x="0" y="0"/>
+          <a:chExt cx="0" cy="0"/>
+        </a:xfrm>
+      </p:grpSpPr>
+      <p:pic>
+        <p:nvPicPr>
+          <p:cNvPr id="4" name="Content Placeholder 3"/>
+          <p:cNvPicPr>
+            <a:picLocks noGrp="1" noChangeAspect="1"/>
+          </p:cNvPicPr>
+          <p:nvPr>
+            <p:ph idx="1"/>
+          </p:nvPr>
+        </p:nvPicPr>
+        <p:blipFill>
+          <a:blip r:embed="rId2" cstate="print">
+            <a:extLst>
+              <a:ext uri="{28A0092B-C50C-407E-A947-70E740481C1C}">
+                <a14:useLocalDpi xmlns:a14="http://schemas.microsoft.com/office/drawing/2010/main" val="0"/>
+              </a:ext>
+            </a:extLst>
+          </a:blip>
+          <a:stretch>
+            <a:fillRect/>
+          </a:stretch>
+        </p:blipFill>
+        <p:spPr>
+          <a:xfrm>
+            <a:off x="2386584" y="291878"/>
+            <a:ext cx="6483096" cy="6483096"/>
+          </a:xfrm>
+        </p:spPr>
+      </p:pic>
+    </p:spTree>
+    <p:extLst>
+      <p:ext uri="{BB962C8B-B14F-4D97-AF65-F5344CB8AC3E}">
+        <p14:creationId xmlns:p14="http://schemas.microsoft.com/office/powerpoint/2010/main" val="1874432673"/>
+      </p:ext>
+    </p:extLst>
+  </p:cSld>
+  <p:clrMapOvr>
+    <a:masterClrMapping/>
+  </p:clrMapOvr>
+  <p:timing>
+    <p:tnLst>
+      <p:par>
+        <p:cTn id="1" dur="indefinite" restart="never" nodeType="tmRoot"/>
+      </p:par>
+    </p:tnLst>
+  </p:timing>
 </p:sld>
 </file>
 

</xml_diff>

<commit_message>
start creating annotation figure
</commit_message>
<xml_diff>
--- a/presentation/comparative_fertility_presentation.pptx
+++ b/presentation/comparative_fertility_presentation.pptx
@@ -269,7 +269,7 @@
           <a:p>
             <a:fld id="{6622FFC5-3883-47EE-9FC1-93C370300F72}" type="datetimeFigureOut">
               <a:rPr lang="en-GB" smtClean="0"/>
-              <a:t>29/06/2016</a:t>
+              <a:t>20/06/2018</a:t>
             </a:fld>
             <a:endParaRPr lang="en-GB"/>
           </a:p>
@@ -439,7 +439,7 @@
           <a:p>
             <a:fld id="{6622FFC5-3883-47EE-9FC1-93C370300F72}" type="datetimeFigureOut">
               <a:rPr lang="en-GB" smtClean="0"/>
-              <a:t>29/06/2016</a:t>
+              <a:t>20/06/2018</a:t>
             </a:fld>
             <a:endParaRPr lang="en-GB"/>
           </a:p>
@@ -619,7 +619,7 @@
           <a:p>
             <a:fld id="{6622FFC5-3883-47EE-9FC1-93C370300F72}" type="datetimeFigureOut">
               <a:rPr lang="en-GB" smtClean="0"/>
-              <a:t>29/06/2016</a:t>
+              <a:t>20/06/2018</a:t>
             </a:fld>
             <a:endParaRPr lang="en-GB"/>
           </a:p>
@@ -789,7 +789,7 @@
           <a:p>
             <a:fld id="{6622FFC5-3883-47EE-9FC1-93C370300F72}" type="datetimeFigureOut">
               <a:rPr lang="en-GB" smtClean="0"/>
-              <a:t>29/06/2016</a:t>
+              <a:t>20/06/2018</a:t>
             </a:fld>
             <a:endParaRPr lang="en-GB"/>
           </a:p>
@@ -1035,7 +1035,7 @@
           <a:p>
             <a:fld id="{6622FFC5-3883-47EE-9FC1-93C370300F72}" type="datetimeFigureOut">
               <a:rPr lang="en-GB" smtClean="0"/>
-              <a:t>29/06/2016</a:t>
+              <a:t>20/06/2018</a:t>
             </a:fld>
             <a:endParaRPr lang="en-GB"/>
           </a:p>
@@ -1267,7 +1267,7 @@
           <a:p>
             <a:fld id="{6622FFC5-3883-47EE-9FC1-93C370300F72}" type="datetimeFigureOut">
               <a:rPr lang="en-GB" smtClean="0"/>
-              <a:t>29/06/2016</a:t>
+              <a:t>20/06/2018</a:t>
             </a:fld>
             <a:endParaRPr lang="en-GB"/>
           </a:p>
@@ -1634,7 +1634,7 @@
           <a:p>
             <a:fld id="{6622FFC5-3883-47EE-9FC1-93C370300F72}" type="datetimeFigureOut">
               <a:rPr lang="en-GB" smtClean="0"/>
-              <a:t>29/06/2016</a:t>
+              <a:t>20/06/2018</a:t>
             </a:fld>
             <a:endParaRPr lang="en-GB"/>
           </a:p>
@@ -1752,7 +1752,7 @@
           <a:p>
             <a:fld id="{6622FFC5-3883-47EE-9FC1-93C370300F72}" type="datetimeFigureOut">
               <a:rPr lang="en-GB" smtClean="0"/>
-              <a:t>29/06/2016</a:t>
+              <a:t>20/06/2018</a:t>
             </a:fld>
             <a:endParaRPr lang="en-GB"/>
           </a:p>
@@ -1847,7 +1847,7 @@
           <a:p>
             <a:fld id="{6622FFC5-3883-47EE-9FC1-93C370300F72}" type="datetimeFigureOut">
               <a:rPr lang="en-GB" smtClean="0"/>
-              <a:t>29/06/2016</a:t>
+              <a:t>20/06/2018</a:t>
             </a:fld>
             <a:endParaRPr lang="en-GB"/>
           </a:p>
@@ -2124,7 +2124,7 @@
           <a:p>
             <a:fld id="{6622FFC5-3883-47EE-9FC1-93C370300F72}" type="datetimeFigureOut">
               <a:rPr lang="en-GB" smtClean="0"/>
-              <a:t>29/06/2016</a:t>
+              <a:t>20/06/2018</a:t>
             </a:fld>
             <a:endParaRPr lang="en-GB"/>
           </a:p>
@@ -2377,7 +2377,7 @@
           <a:p>
             <a:fld id="{6622FFC5-3883-47EE-9FC1-93C370300F72}" type="datetimeFigureOut">
               <a:rPr lang="en-GB" smtClean="0"/>
-              <a:t>29/06/2016</a:t>
+              <a:t>20/06/2018</a:t>
             </a:fld>
             <a:endParaRPr lang="en-GB"/>
           </a:p>
@@ -2590,7 +2590,7 @@
           <a:p>
             <a:fld id="{6622FFC5-3883-47EE-9FC1-93C370300F72}" type="datetimeFigureOut">
               <a:rPr lang="en-GB" smtClean="0"/>
-              <a:t>29/06/2016</a:t>
+              <a:t>20/06/2018</a:t>
             </a:fld>
             <a:endParaRPr lang="en-GB"/>
           </a:p>
@@ -3018,11 +3018,7 @@
             </a:r>
             <a:r>
               <a:rPr lang="en-GB" smtClean="0"/>
-              <a:t>of </a:t>
-            </a:r>
-            <a:r>
-              <a:rPr lang="en-GB" smtClean="0"/>
-              <a:t>45 </a:t>
+              <a:t>of 45 </a:t>
             </a:r>
             <a:r>
               <a:rPr lang="en-GB" dirty="0" smtClean="0"/>
@@ -3562,7 +3558,19 @@
             </a:r>
             <a:r>
               <a:rPr lang="en-GB" i="1" dirty="0"/>
-              <a:t>, purr – for general data management and automation</a:t>
+              <a:t>, </a:t>
+            </a:r>
+            <a:r>
+              <a:rPr lang="en-GB" i="1" dirty="0" err="1" smtClean="0"/>
+              <a:t>purrr</a:t>
+            </a:r>
+            <a:r>
+              <a:rPr lang="en-GB" i="1" dirty="0" smtClean="0"/>
+              <a:t> </a:t>
+            </a:r>
+            <a:r>
+              <a:rPr lang="en-GB" i="1" dirty="0"/>
+              <a:t>– for general data management and automation</a:t>
             </a:r>
           </a:p>
           <a:p>
@@ -5854,6 +5862,13 @@
   <p:clrMapOvr>
     <a:masterClrMapping/>
   </p:clrMapOvr>
+  <p:timing>
+    <p:tnLst>
+      <p:par>
+        <p:cTn id="1" dur="indefinite" restart="never" nodeType="tmRoot"/>
+      </p:par>
+    </p:tnLst>
+  </p:timing>
 </p:sld>
 </file>
 

</xml_diff>